<commit_message>
Running recommended script. Need to fix search bar
</commit_message>
<xml_diff>
--- a/Documentation/Final Presentation Slides.pptx
+++ b/Documentation/Final Presentation Slides.pptx
@@ -4,16 +4,21 @@
   <p:sldMasterIdLst>
     <p:sldMasterId id="2147483648" r:id="rId1"/>
   </p:sldMasterIdLst>
+  <p:notesMasterIdLst>
+    <p:notesMasterId r:id="rId13"/>
+  </p:notesMasterIdLst>
   <p:sldIdLst>
     <p:sldId id="256" r:id="rId2"/>
     <p:sldId id="257" r:id="rId3"/>
     <p:sldId id="258" r:id="rId4"/>
     <p:sldId id="259" r:id="rId5"/>
-    <p:sldId id="260" r:id="rId6"/>
-    <p:sldId id="261" r:id="rId7"/>
-    <p:sldId id="262" r:id="rId8"/>
-    <p:sldId id="263" r:id="rId9"/>
-    <p:sldId id="264" r:id="rId10"/>
+    <p:sldId id="265" r:id="rId6"/>
+    <p:sldId id="260" r:id="rId7"/>
+    <p:sldId id="266" r:id="rId8"/>
+    <p:sldId id="261" r:id="rId9"/>
+    <p:sldId id="262" r:id="rId10"/>
+    <p:sldId id="263" r:id="rId11"/>
+    <p:sldId id="264" r:id="rId12"/>
   </p:sldIdLst>
   <p:sldSz cx="12192000" cy="6858000"/>
   <p:notesSz cx="6858000" cy="9144000"/>
@@ -112,13 +117,20 @@
       </a:defRPr>
     </a:lvl9pPr>
   </p:defaultTextStyle>
+  <p:extLst>
+    <p:ext uri="{EFAFB233-063F-42B5-8137-9DF3F51BA10A}">
+      <p15:sldGuideLst xmlns:p15="http://schemas.microsoft.com/office/powerpoint/2012/main"/>
+    </p:ext>
+  </p:extLst>
 </p:presentation>
 </file>
 
 <file path=ppt/revisionInfo.xml><?xml version="1.0" encoding="utf-8"?>
 <p1510:revInfo xmlns:a="http://schemas.openxmlformats.org/drawingml/2006/main" xmlns:r="http://schemas.openxmlformats.org/officeDocument/2006/relationships" xmlns:p1510="http://schemas.microsoft.com/office/powerpoint/2015/10/main">
   <p1510:revLst>
-    <p1510:client id="{45F0CC22-385B-43CC-9D91-4794FF1EBBF0}" v="212" dt="2025-11-12T17:27:36.393"/>
+    <p1510:client id="{45F0CC22-385B-43CC-9D91-4794FF1EBBF0}" v="12" dt="2025-11-18T20:05:08.743"/>
+    <p1510:client id="{760AFDC9-3F23-AA3E-AD88-FA76E65A2519}" v="21" dt="2025-11-18T20:31:54.751"/>
+    <p1510:client id="{B11C228C-261D-497C-B0CA-33D864AC70E3}" v="22" dt="2025-11-19T17:36:46.791"/>
   </p1510:revLst>
 </p1510:revInfo>
 </file>
@@ -128,7 +140,7 @@
   <pc:docChgLst>
     <pc:chgData name="Hunter T Smith" userId="85048cc5-0361-478c-b7ab-429a8b03b5c9" providerId="ADAL" clId="{EE23C152-F5A7-494E-894C-B664F80D40D8}"/>
     <pc:docChg chg="undo custSel mod addSld modSld">
-      <pc:chgData name="Hunter T Smith" userId="85048cc5-0361-478c-b7ab-429a8b03b5c9" providerId="ADAL" clId="{EE23C152-F5A7-494E-894C-B664F80D40D8}" dt="2025-11-12T17:27:36.393" v="302" actId="20577"/>
+      <pc:chgData name="Hunter T Smith" userId="85048cc5-0361-478c-b7ab-429a8b03b5c9" providerId="ADAL" clId="{EE23C152-F5A7-494E-894C-B664F80D40D8}" dt="2025-11-18T20:05:08.743" v="1290" actId="1076"/>
       <pc:docMkLst>
         <pc:docMk/>
       </pc:docMkLst>
@@ -193,8 +205,8 @@
           </ac:spMkLst>
         </pc:spChg>
       </pc:sldChg>
-      <pc:sldChg chg="modSp new mod">
-        <pc:chgData name="Hunter T Smith" userId="85048cc5-0361-478c-b7ab-429a8b03b5c9" providerId="ADAL" clId="{EE23C152-F5A7-494E-894C-B664F80D40D8}" dt="2025-11-12T17:25:23.038" v="156" actId="20577"/>
+      <pc:sldChg chg="addSp delSp modSp new mod modNotesTx">
+        <pc:chgData name="Hunter T Smith" userId="85048cc5-0361-478c-b7ab-429a8b03b5c9" providerId="ADAL" clId="{EE23C152-F5A7-494E-894C-B664F80D40D8}" dt="2025-11-18T15:02:45.062" v="475" actId="20577"/>
         <pc:sldMkLst>
           <pc:docMk/>
           <pc:sldMk cId="820991900" sldId="259"/>
@@ -207,14 +219,30 @@
             <ac:spMk id="2" creationId="{DAF3C756-8F2A-631C-50E0-E83062DB3A2D}"/>
           </ac:spMkLst>
         </pc:spChg>
-        <pc:spChg chg="mod">
-          <ac:chgData name="Hunter T Smith" userId="85048cc5-0361-478c-b7ab-429a8b03b5c9" providerId="ADAL" clId="{EE23C152-F5A7-494E-894C-B664F80D40D8}" dt="2025-11-12T17:25:23.038" v="156" actId="20577"/>
+        <pc:spChg chg="del mod">
+          <ac:chgData name="Hunter T Smith" userId="85048cc5-0361-478c-b7ab-429a8b03b5c9" providerId="ADAL" clId="{EE23C152-F5A7-494E-894C-B664F80D40D8}" dt="2025-11-18T15:01:47.486" v="303" actId="478"/>
           <ac:spMkLst>
             <pc:docMk/>
             <pc:sldMk cId="820991900" sldId="259"/>
             <ac:spMk id="3" creationId="{6347159A-AA8B-85FF-8E38-91495F744FF1}"/>
           </ac:spMkLst>
         </pc:spChg>
+        <pc:spChg chg="add mod">
+          <ac:chgData name="Hunter T Smith" userId="85048cc5-0361-478c-b7ab-429a8b03b5c9" providerId="ADAL" clId="{EE23C152-F5A7-494E-894C-B664F80D40D8}" dt="2025-11-18T15:01:47.486" v="303" actId="478"/>
+          <ac:spMkLst>
+            <pc:docMk/>
+            <pc:sldMk cId="820991900" sldId="259"/>
+            <ac:spMk id="5" creationId="{1B740839-13A7-7E6B-59D7-E8FBBABB5A5C}"/>
+          </ac:spMkLst>
+        </pc:spChg>
+        <pc:picChg chg="add mod">
+          <ac:chgData name="Hunter T Smith" userId="85048cc5-0361-478c-b7ab-429a8b03b5c9" providerId="ADAL" clId="{EE23C152-F5A7-494E-894C-B664F80D40D8}" dt="2025-11-18T15:01:54.608" v="306" actId="14100"/>
+          <ac:picMkLst>
+            <pc:docMk/>
+            <pc:sldMk cId="820991900" sldId="259"/>
+            <ac:picMk id="1026" creationId="{0EFD3F6E-9684-9D11-8B7A-D2E090AF12C0}"/>
+          </ac:picMkLst>
+        </pc:picChg>
       </pc:sldChg>
       <pc:sldChg chg="modSp new mod">
         <pc:chgData name="Hunter T Smith" userId="85048cc5-0361-478c-b7ab-429a8b03b5c9" providerId="ADAL" clId="{EE23C152-F5A7-494E-894C-B664F80D40D8}" dt="2025-11-12T17:26:23.769" v="183" actId="20577"/>
@@ -247,13 +275,13 @@
         </pc:spChg>
       </pc:sldChg>
       <pc:sldChg chg="modSp new mod">
-        <pc:chgData name="Hunter T Smith" userId="85048cc5-0361-478c-b7ab-429a8b03b5c9" providerId="ADAL" clId="{EE23C152-F5A7-494E-894C-B664F80D40D8}" dt="2025-11-12T17:26:56.460" v="223" actId="20577"/>
+        <pc:chgData name="Hunter T Smith" userId="85048cc5-0361-478c-b7ab-429a8b03b5c9" providerId="ADAL" clId="{EE23C152-F5A7-494E-894C-B664F80D40D8}" dt="2025-11-18T18:16:38.538" v="1279" actId="20577"/>
         <pc:sldMkLst>
           <pc:docMk/>
           <pc:sldMk cId="2022626399" sldId="262"/>
         </pc:sldMkLst>
         <pc:spChg chg="mod">
-          <ac:chgData name="Hunter T Smith" userId="85048cc5-0361-478c-b7ab-429a8b03b5c9" providerId="ADAL" clId="{EE23C152-F5A7-494E-894C-B664F80D40D8}" dt="2025-11-12T17:26:56.460" v="223" actId="20577"/>
+          <ac:chgData name="Hunter T Smith" userId="85048cc5-0361-478c-b7ab-429a8b03b5c9" providerId="ADAL" clId="{EE23C152-F5A7-494E-894C-B664F80D40D8}" dt="2025-11-18T18:16:38.538" v="1279" actId="20577"/>
           <ac:spMkLst>
             <pc:docMk/>
             <pc:sldMk cId="2022626399" sldId="262"/>
@@ -276,24 +304,1155 @@
           </ac:spMkLst>
         </pc:spChg>
       </pc:sldChg>
-      <pc:sldChg chg="modSp new mod">
-        <pc:chgData name="Hunter T Smith" userId="85048cc5-0361-478c-b7ab-429a8b03b5c9" providerId="ADAL" clId="{EE23C152-F5A7-494E-894C-B664F80D40D8}" dt="2025-11-12T17:27:12.662" v="280" actId="20577"/>
+      <pc:sldChg chg="addSp delSp modSp new mod setBg">
+        <pc:chgData name="Hunter T Smith" userId="85048cc5-0361-478c-b7ab-429a8b03b5c9" providerId="ADAL" clId="{EE23C152-F5A7-494E-894C-B664F80D40D8}" dt="2025-11-18T20:05:08.743" v="1290" actId="1076"/>
         <pc:sldMkLst>
           <pc:docMk/>
           <pc:sldMk cId="4208121231" sldId="264"/>
         </pc:sldMkLst>
-        <pc:spChg chg="mod">
-          <ac:chgData name="Hunter T Smith" userId="85048cc5-0361-478c-b7ab-429a8b03b5c9" providerId="ADAL" clId="{EE23C152-F5A7-494E-894C-B664F80D40D8}" dt="2025-11-12T17:27:12.662" v="280" actId="20577"/>
+        <pc:spChg chg="mod ord">
+          <ac:chgData name="Hunter T Smith" userId="85048cc5-0361-478c-b7ab-429a8b03b5c9" providerId="ADAL" clId="{EE23C152-F5A7-494E-894C-B664F80D40D8}" dt="2025-11-18T20:04:59.874" v="1285" actId="26606"/>
           <ac:spMkLst>
             <pc:docMk/>
             <pc:sldMk cId="4208121231" sldId="264"/>
             <ac:spMk id="2" creationId="{333DCC2F-63C6-155E-2F14-ECA88B217974}"/>
           </ac:spMkLst>
         </pc:spChg>
+        <pc:spChg chg="add del mod">
+          <ac:chgData name="Hunter T Smith" userId="85048cc5-0361-478c-b7ab-429a8b03b5c9" providerId="ADAL" clId="{EE23C152-F5A7-494E-894C-B664F80D40D8}" dt="2025-11-18T20:04:59.874" v="1285" actId="26606"/>
+          <ac:spMkLst>
+            <pc:docMk/>
+            <pc:sldMk cId="4208121231" sldId="264"/>
+            <ac:spMk id="3" creationId="{CA21D293-01F4-83D1-4E76-EF3B5C59F821}"/>
+          </ac:spMkLst>
+        </pc:spChg>
+        <pc:spChg chg="add del">
+          <ac:chgData name="Hunter T Smith" userId="85048cc5-0361-478c-b7ab-429a8b03b5c9" providerId="ADAL" clId="{EE23C152-F5A7-494E-894C-B664F80D40D8}" dt="2025-11-18T20:04:57.412" v="1283" actId="26606"/>
+          <ac:spMkLst>
+            <pc:docMk/>
+            <pc:sldMk cId="4208121231" sldId="264"/>
+            <ac:spMk id="2055" creationId="{04812C46-200A-4DEB-A05E-3ED6C68C2387}"/>
+          </ac:spMkLst>
+        </pc:spChg>
+        <pc:spChg chg="add del">
+          <ac:chgData name="Hunter T Smith" userId="85048cc5-0361-478c-b7ab-429a8b03b5c9" providerId="ADAL" clId="{EE23C152-F5A7-494E-894C-B664F80D40D8}" dt="2025-11-18T20:04:57.412" v="1283" actId="26606"/>
+          <ac:spMkLst>
+            <pc:docMk/>
+            <pc:sldMk cId="4208121231" sldId="264"/>
+            <ac:spMk id="2057" creationId="{D1EA859B-E555-4109-94F3-6700E046E008}"/>
+          </ac:spMkLst>
+        </pc:spChg>
+        <pc:spChg chg="add del">
+          <ac:chgData name="Hunter T Smith" userId="85048cc5-0361-478c-b7ab-429a8b03b5c9" providerId="ADAL" clId="{EE23C152-F5A7-494E-894C-B664F80D40D8}" dt="2025-11-18T20:04:59.874" v="1285" actId="26606"/>
+          <ac:spMkLst>
+            <pc:docMk/>
+            <pc:sldMk cId="4208121231" sldId="264"/>
+            <ac:spMk id="2060" creationId="{37C89E4B-3C9F-44B9-8B86-D9E3D112D8EC}"/>
+          </ac:spMkLst>
+        </pc:spChg>
+        <pc:picChg chg="add mod ord">
+          <ac:chgData name="Hunter T Smith" userId="85048cc5-0361-478c-b7ab-429a8b03b5c9" providerId="ADAL" clId="{EE23C152-F5A7-494E-894C-B664F80D40D8}" dt="2025-11-18T20:05:08.743" v="1290" actId="1076"/>
+          <ac:picMkLst>
+            <pc:docMk/>
+            <pc:sldMk cId="4208121231" sldId="264"/>
+            <ac:picMk id="2050" creationId="{A87193E6-C65C-A50E-E65A-9A5F30A748AD}"/>
+          </ac:picMkLst>
+        </pc:picChg>
+        <pc:cxnChg chg="add del">
+          <ac:chgData name="Hunter T Smith" userId="85048cc5-0361-478c-b7ab-429a8b03b5c9" providerId="ADAL" clId="{EE23C152-F5A7-494E-894C-B664F80D40D8}" dt="2025-11-18T20:04:59.874" v="1285" actId="26606"/>
+          <ac:cxnSpMkLst>
+            <pc:docMk/>
+            <pc:sldMk cId="4208121231" sldId="264"/>
+            <ac:cxnSpMk id="2059" creationId="{D891E407-403B-4764-86C9-33A56D3BCAA3}"/>
+          </ac:cxnSpMkLst>
+        </pc:cxnChg>
+        <pc:cxnChg chg="add del">
+          <ac:chgData name="Hunter T Smith" userId="85048cc5-0361-478c-b7ab-429a8b03b5c9" providerId="ADAL" clId="{EE23C152-F5A7-494E-894C-B664F80D40D8}" dt="2025-11-18T20:04:59.874" v="1285" actId="26606"/>
+          <ac:cxnSpMkLst>
+            <pc:docMk/>
+            <pc:sldMk cId="4208121231" sldId="264"/>
+            <ac:cxnSpMk id="2061" creationId="{AA2EAA10-076F-46BD-8F0F-B9A2FB77A85C}"/>
+          </ac:cxnSpMkLst>
+        </pc:cxnChg>
+      </pc:sldChg>
+      <pc:sldChg chg="addSp delSp modSp new mod setBg modNotesTx">
+        <pc:chgData name="Hunter T Smith" userId="85048cc5-0361-478c-b7ab-429a8b03b5c9" providerId="ADAL" clId="{EE23C152-F5A7-494E-894C-B664F80D40D8}" dt="2025-11-18T15:03:56.591" v="662" actId="1076"/>
+        <pc:sldMkLst>
+          <pc:docMk/>
+          <pc:sldMk cId="2387232387" sldId="265"/>
+        </pc:sldMkLst>
+        <pc:spChg chg="mod">
+          <ac:chgData name="Hunter T Smith" userId="85048cc5-0361-478c-b7ab-429a8b03b5c9" providerId="ADAL" clId="{EE23C152-F5A7-494E-894C-B664F80D40D8}" dt="2025-11-18T15:03:56.591" v="662" actId="1076"/>
+          <ac:spMkLst>
+            <pc:docMk/>
+            <pc:sldMk cId="2387232387" sldId="265"/>
+            <ac:spMk id="2" creationId="{EEA7B1C0-ACBE-5B85-AD51-1025E455B671}"/>
+          </ac:spMkLst>
+        </pc:spChg>
+        <pc:spChg chg="del">
+          <ac:chgData name="Hunter T Smith" userId="85048cc5-0361-478c-b7ab-429a8b03b5c9" providerId="ADAL" clId="{EE23C152-F5A7-494E-894C-B664F80D40D8}" dt="2025-11-18T15:03:30.083" v="657" actId="26606"/>
+          <ac:spMkLst>
+            <pc:docMk/>
+            <pc:sldMk cId="2387232387" sldId="265"/>
+            <ac:spMk id="3" creationId="{704D0704-EDCE-DB03-9CA4-27D5C0D281D9}"/>
+          </ac:spMkLst>
+        </pc:spChg>
+        <pc:spChg chg="add">
+          <ac:chgData name="Hunter T Smith" userId="85048cc5-0361-478c-b7ab-429a8b03b5c9" providerId="ADAL" clId="{EE23C152-F5A7-494E-894C-B664F80D40D8}" dt="2025-11-18T15:03:30.083" v="657" actId="26606"/>
+          <ac:spMkLst>
+            <pc:docMk/>
+            <pc:sldMk cId="2387232387" sldId="265"/>
+            <ac:spMk id="9" creationId="{C1DD1A8A-57D5-4A81-AD04-532B043C5611}"/>
+          </ac:spMkLst>
+        </pc:spChg>
+        <pc:spChg chg="add">
+          <ac:chgData name="Hunter T Smith" userId="85048cc5-0361-478c-b7ab-429a8b03b5c9" providerId="ADAL" clId="{EE23C152-F5A7-494E-894C-B664F80D40D8}" dt="2025-11-18T15:03:30.083" v="657" actId="26606"/>
+          <ac:spMkLst>
+            <pc:docMk/>
+            <pc:sldMk cId="2387232387" sldId="265"/>
+            <ac:spMk id="11" creationId="{007891EC-4501-44ED-A8C8-B11B6DB767AB}"/>
+          </ac:spMkLst>
+        </pc:spChg>
+        <pc:picChg chg="add mod">
+          <ac:chgData name="Hunter T Smith" userId="85048cc5-0361-478c-b7ab-429a8b03b5c9" providerId="ADAL" clId="{EE23C152-F5A7-494E-894C-B664F80D40D8}" dt="2025-11-18T15:03:47.973" v="661" actId="1076"/>
+          <ac:picMkLst>
+            <pc:docMk/>
+            <pc:sldMk cId="2387232387" sldId="265"/>
+            <ac:picMk id="5" creationId="{B3C86C18-6E9F-0DF9-1B66-1E117AA7D9B4}"/>
+          </ac:picMkLst>
+        </pc:picChg>
+      </pc:sldChg>
+      <pc:sldChg chg="modSp new mod modNotesTx">
+        <pc:chgData name="Hunter T Smith" userId="85048cc5-0361-478c-b7ab-429a8b03b5c9" providerId="ADAL" clId="{EE23C152-F5A7-494E-894C-B664F80D40D8}" dt="2025-11-18T15:35:52.853" v="1276" actId="20577"/>
+        <pc:sldMkLst>
+          <pc:docMk/>
+          <pc:sldMk cId="844050267" sldId="266"/>
+        </pc:sldMkLst>
+        <pc:spChg chg="mod">
+          <ac:chgData name="Hunter T Smith" userId="85048cc5-0361-478c-b7ab-429a8b03b5c9" providerId="ADAL" clId="{EE23C152-F5A7-494E-894C-B664F80D40D8}" dt="2025-11-18T15:08:55.835" v="684" actId="20577"/>
+          <ac:spMkLst>
+            <pc:docMk/>
+            <pc:sldMk cId="844050267" sldId="266"/>
+            <ac:spMk id="2" creationId="{D3F38EFC-D39D-9AD2-7227-26B31AA23308}"/>
+          </ac:spMkLst>
+        </pc:spChg>
+        <pc:spChg chg="mod">
+          <ac:chgData name="Hunter T Smith" userId="85048cc5-0361-478c-b7ab-429a8b03b5c9" providerId="ADAL" clId="{EE23C152-F5A7-494E-894C-B664F80D40D8}" dt="2025-11-18T15:35:52.853" v="1276" actId="20577"/>
+          <ac:spMkLst>
+            <pc:docMk/>
+            <pc:sldMk cId="844050267" sldId="266"/>
+            <ac:spMk id="3" creationId="{C1A7868B-4A67-5DE6-A078-C407C7B20D39}"/>
+          </ac:spMkLst>
+        </pc:spChg>
+      </pc:sldChg>
+    </pc:docChg>
+  </pc:docChgLst>
+  <pc:docChgLst>
+    <pc:chgData name="Darien Walker" userId="47bc5b70-f244-4f40-b1f1-076c4d9f0e1b" providerId="ADAL" clId="{9095B452-EC19-4458-B93A-FBCB7805DC5B}"/>
+    <pc:docChg chg="custSel modSld">
+      <pc:chgData name="Darien Walker" userId="47bc5b70-f244-4f40-b1f1-076c4d9f0e1b" providerId="ADAL" clId="{9095B452-EC19-4458-B93A-FBCB7805DC5B}" dt="2025-11-19T17:36:46.791" v="56" actId="20577"/>
+      <pc:docMkLst>
+        <pc:docMk/>
+      </pc:docMkLst>
+      <pc:sldChg chg="addSp delSp modSp mod">
+        <pc:chgData name="Darien Walker" userId="47bc5b70-f244-4f40-b1f1-076c4d9f0e1b" providerId="ADAL" clId="{9095B452-EC19-4458-B93A-FBCB7805DC5B}" dt="2025-11-19T05:02:09.702" v="36" actId="20577"/>
+        <pc:sldMkLst>
+          <pc:docMk/>
+          <pc:sldMk cId="581820033" sldId="260"/>
+        </pc:sldMkLst>
+        <pc:spChg chg="mod">
+          <ac:chgData name="Darien Walker" userId="47bc5b70-f244-4f40-b1f1-076c4d9f0e1b" providerId="ADAL" clId="{9095B452-EC19-4458-B93A-FBCB7805DC5B}" dt="2025-11-19T05:02:09.702" v="36" actId="20577"/>
+          <ac:spMkLst>
+            <pc:docMk/>
+            <pc:sldMk cId="581820033" sldId="260"/>
+            <ac:spMk id="3" creationId="{8C2ADA0D-3EF2-7A88-6311-1F3D1564B422}"/>
+          </ac:spMkLst>
+        </pc:spChg>
+        <pc:spChg chg="add del mod">
+          <ac:chgData name="Darien Walker" userId="47bc5b70-f244-4f40-b1f1-076c4d9f0e1b" providerId="ADAL" clId="{9095B452-EC19-4458-B93A-FBCB7805DC5B}" dt="2025-11-19T05:01:09.658" v="6"/>
+          <ac:spMkLst>
+            <pc:docMk/>
+            <pc:sldMk cId="581820033" sldId="260"/>
+            <ac:spMk id="4" creationId="{FD8D7760-2D14-A4BD-DB71-D7442AA7CEC0}"/>
+          </ac:spMkLst>
+        </pc:spChg>
+      </pc:sldChg>
+      <pc:sldChg chg="addSp delSp modSp mod">
+        <pc:chgData name="Darien Walker" userId="47bc5b70-f244-4f40-b1f1-076c4d9f0e1b" providerId="ADAL" clId="{9095B452-EC19-4458-B93A-FBCB7805DC5B}" dt="2025-11-19T17:36:46.791" v="56" actId="20577"/>
+        <pc:sldMkLst>
+          <pc:docMk/>
+          <pc:sldMk cId="4041947008" sldId="261"/>
+        </pc:sldMkLst>
+        <pc:spChg chg="del">
+          <ac:chgData name="Darien Walker" userId="47bc5b70-f244-4f40-b1f1-076c4d9f0e1b" providerId="ADAL" clId="{9095B452-EC19-4458-B93A-FBCB7805DC5B}" dt="2025-11-19T17:34:12.771" v="37"/>
+          <ac:spMkLst>
+            <pc:docMk/>
+            <pc:sldMk cId="4041947008" sldId="261"/>
+            <ac:spMk id="3" creationId="{01D99C7A-B5F3-BF16-461E-0A715D3C58FF}"/>
+          </ac:spMkLst>
+        </pc:spChg>
+        <pc:spChg chg="add mod">
+          <ac:chgData name="Darien Walker" userId="47bc5b70-f244-4f40-b1f1-076c4d9f0e1b" providerId="ADAL" clId="{9095B452-EC19-4458-B93A-FBCB7805DC5B}" dt="2025-11-19T17:36:46.791" v="56" actId="20577"/>
+          <ac:spMkLst>
+            <pc:docMk/>
+            <pc:sldMk cId="4041947008" sldId="261"/>
+            <ac:spMk id="4" creationId="{9F5191A0-07CA-8920-D644-575723A6AAAE}"/>
+          </ac:spMkLst>
+        </pc:spChg>
+      </pc:sldChg>
+    </pc:docChg>
+  </pc:docChgLst>
+  <pc:docChgLst>
+    <pc:chgData name="Darien Walker" userId="S::dwal1641@students.vsu.edu::47bc5b70-f244-4f40-b1f1-076c4d9f0e1b" providerId="AD" clId="Web-{760AFDC9-3F23-AA3E-AD88-FA76E65A2519}"/>
+    <pc:docChg chg="modSld">
+      <pc:chgData name="Darien Walker" userId="S::dwal1641@students.vsu.edu::47bc5b70-f244-4f40-b1f1-076c4d9f0e1b" providerId="AD" clId="Web-{760AFDC9-3F23-AA3E-AD88-FA76E65A2519}" dt="2025-11-18T20:45:45.531" v="23"/>
+      <pc:docMkLst>
+        <pc:docMk/>
+      </pc:docMkLst>
+      <pc:sldChg chg="addSp delSp modSp mod setBg modNotes">
+        <pc:chgData name="Darien Walker" userId="S::dwal1641@students.vsu.edu::47bc5b70-f244-4f40-b1f1-076c4d9f0e1b" providerId="AD" clId="Web-{760AFDC9-3F23-AA3E-AD88-FA76E65A2519}" dt="2025-11-18T20:45:45.531" v="23"/>
+        <pc:sldMkLst>
+          <pc:docMk/>
+          <pc:sldMk cId="2387232387" sldId="265"/>
+        </pc:sldMkLst>
+        <pc:spChg chg="add del">
+          <ac:chgData name="Darien Walker" userId="S::dwal1641@students.vsu.edu::47bc5b70-f244-4f40-b1f1-076c4d9f0e1b" providerId="AD" clId="Web-{760AFDC9-3F23-AA3E-AD88-FA76E65A2519}" dt="2025-11-18T20:29:45.716" v="1"/>
+          <ac:spMkLst>
+            <pc:docMk/>
+            <pc:sldMk cId="2387232387" sldId="265"/>
+            <ac:spMk id="3" creationId="{83B48F2A-BC5B-66D8-C0A1-E30D44FDC014}"/>
+          </ac:spMkLst>
+        </pc:spChg>
+        <pc:spChg chg="add del">
+          <ac:chgData name="Darien Walker" userId="S::dwal1641@students.vsu.edu::47bc5b70-f244-4f40-b1f1-076c4d9f0e1b" providerId="AD" clId="Web-{760AFDC9-3F23-AA3E-AD88-FA76E65A2519}" dt="2025-11-18T20:30:04.607" v="5"/>
+          <ac:spMkLst>
+            <pc:docMk/>
+            <pc:sldMk cId="2387232387" sldId="265"/>
+            <ac:spMk id="4" creationId="{2763CB59-386E-6D76-7876-2FB8851111EC}"/>
+          </ac:spMkLst>
+        </pc:spChg>
+        <pc:picChg chg="add del mod modCrop">
+          <ac:chgData name="Darien Walker" userId="S::dwal1641@students.vsu.edu::47bc5b70-f244-4f40-b1f1-076c4d9f0e1b" providerId="AD" clId="Web-{760AFDC9-3F23-AA3E-AD88-FA76E65A2519}" dt="2025-11-18T20:31:54.751" v="20" actId="1076"/>
+          <ac:picMkLst>
+            <pc:docMk/>
+            <pc:sldMk cId="2387232387" sldId="265"/>
+            <ac:picMk id="5" creationId="{B3C86C18-6E9F-0DF9-1B66-1E117AA7D9B4}"/>
+          </ac:picMkLst>
+        </pc:picChg>
+      </pc:sldChg>
+    </pc:docChg>
+  </pc:docChgLst>
+  <pc:docChgLst>
+    <pc:chgData name="Darien Walker" userId="S::dwal1641@students.vsu.edu::47bc5b70-f244-4f40-b1f1-076c4d9f0e1b" providerId="AD" clId="Web-{7459BD68-0644-0DD8-2394-A682AB2946B9}"/>
+    <pc:docChg chg="modSld">
+      <pc:chgData name="Darien Walker" userId="S::dwal1641@students.vsu.edu::47bc5b70-f244-4f40-b1f1-076c4d9f0e1b" providerId="AD" clId="Web-{7459BD68-0644-0DD8-2394-A682AB2946B9}" dt="2025-11-17T21:41:35.751" v="50" actId="20577"/>
+      <pc:docMkLst>
+        <pc:docMk/>
+      </pc:docMkLst>
+      <pc:sldChg chg="modSp">
+        <pc:chgData name="Darien Walker" userId="S::dwal1641@students.vsu.edu::47bc5b70-f244-4f40-b1f1-076c4d9f0e1b" providerId="AD" clId="Web-{7459BD68-0644-0DD8-2394-A682AB2946B9}" dt="2025-11-17T21:40:18.766" v="36" actId="20577"/>
+        <pc:sldMkLst>
+          <pc:docMk/>
+          <pc:sldMk cId="820991900" sldId="259"/>
+        </pc:sldMkLst>
+        <pc:spChg chg="mod">
+          <ac:chgData name="Darien Walker" userId="S::dwal1641@students.vsu.edu::47bc5b70-f244-4f40-b1f1-076c4d9f0e1b" providerId="AD" clId="Web-{7459BD68-0644-0DD8-2394-A682AB2946B9}" dt="2025-11-17T21:36:13.578" v="10" actId="20577"/>
+          <ac:spMkLst>
+            <pc:docMk/>
+            <pc:sldMk cId="820991900" sldId="259"/>
+            <ac:spMk id="2" creationId="{DAF3C756-8F2A-631C-50E0-E83062DB3A2D}"/>
+          </ac:spMkLst>
+        </pc:spChg>
+        <pc:spChg chg="mod">
+          <ac:chgData name="Darien Walker" userId="S::dwal1641@students.vsu.edu::47bc5b70-f244-4f40-b1f1-076c4d9f0e1b" providerId="AD" clId="Web-{7459BD68-0644-0DD8-2394-A682AB2946B9}" dt="2025-11-17T21:40:18.766" v="36" actId="20577"/>
+          <ac:spMkLst>
+            <pc:docMk/>
+            <pc:sldMk cId="820991900" sldId="259"/>
+            <ac:spMk id="3" creationId="{6347159A-AA8B-85FF-8E38-91495F744FF1}"/>
+          </ac:spMkLst>
+        </pc:spChg>
+      </pc:sldChg>
+      <pc:sldChg chg="modSp">
+        <pc:chgData name="Darien Walker" userId="S::dwal1641@students.vsu.edu::47bc5b70-f244-4f40-b1f1-076c4d9f0e1b" providerId="AD" clId="Web-{7459BD68-0644-0DD8-2394-A682AB2946B9}" dt="2025-11-17T21:41:35.751" v="50" actId="20577"/>
+        <pc:sldMkLst>
+          <pc:docMk/>
+          <pc:sldMk cId="581820033" sldId="260"/>
+        </pc:sldMkLst>
+        <pc:spChg chg="mod">
+          <ac:chgData name="Darien Walker" userId="S::dwal1641@students.vsu.edu::47bc5b70-f244-4f40-b1f1-076c4d9f0e1b" providerId="AD" clId="Web-{7459BD68-0644-0DD8-2394-A682AB2946B9}" dt="2025-11-17T21:41:35.751" v="50" actId="20577"/>
+          <ac:spMkLst>
+            <pc:docMk/>
+            <pc:sldMk cId="581820033" sldId="260"/>
+            <ac:spMk id="3" creationId="{8C2ADA0D-3EF2-7A88-6311-1F3D1564B422}"/>
+          </ac:spMkLst>
+        </pc:spChg>
       </pc:sldChg>
     </pc:docChg>
   </pc:docChgLst>
 </pc:chgInfo>
+</file>
+
+<file path=ppt/notesMasters/notesMaster1.xml><?xml version="1.0" encoding="utf-8"?>
+<p:notesMaster xmlns:a="http://schemas.openxmlformats.org/drawingml/2006/main" xmlns:r="http://schemas.openxmlformats.org/officeDocument/2006/relationships" xmlns:p="http://schemas.openxmlformats.org/presentationml/2006/main">
+  <p:cSld>
+    <p:bg>
+      <p:bgRef idx="1001">
+        <a:schemeClr val="bg1"/>
+      </p:bgRef>
+    </p:bg>
+    <p:spTree>
+      <p:nvGrpSpPr>
+        <p:cNvPr id="1" name=""/>
+        <p:cNvGrpSpPr/>
+        <p:nvPr/>
+      </p:nvGrpSpPr>
+      <p:grpSpPr>
+        <a:xfrm>
+          <a:off x="0" y="0"/>
+          <a:ext cx="0" cy="0"/>
+          <a:chOff x="0" y="0"/>
+          <a:chExt cx="0" cy="0"/>
+        </a:xfrm>
+      </p:grpSpPr>
+      <p:sp>
+        <p:nvSpPr>
+          <p:cNvPr id="2" name="Header Placeholder 1"/>
+          <p:cNvSpPr>
+            <a:spLocks noGrp="1"/>
+          </p:cNvSpPr>
+          <p:nvPr>
+            <p:ph type="hdr" sz="quarter"/>
+          </p:nvPr>
+        </p:nvSpPr>
+        <p:spPr>
+          <a:xfrm>
+            <a:off x="0" y="0"/>
+            <a:ext cx="2971800" cy="458788"/>
+          </a:xfrm>
+          <a:prstGeom prst="rect">
+            <a:avLst/>
+          </a:prstGeom>
+        </p:spPr>
+        <p:txBody>
+          <a:bodyPr vert="horz" lIns="91440" tIns="45720" rIns="91440" bIns="45720" rtlCol="0"/>
+          <a:lstStyle>
+            <a:lvl1pPr algn="l">
+              <a:defRPr sz="1200"/>
+            </a:lvl1pPr>
+          </a:lstStyle>
+          <a:p>
+            <a:endParaRPr lang="en-US"/>
+          </a:p>
+        </p:txBody>
+      </p:sp>
+      <p:sp>
+        <p:nvSpPr>
+          <p:cNvPr id="3" name="Date Placeholder 2"/>
+          <p:cNvSpPr>
+            <a:spLocks noGrp="1"/>
+          </p:cNvSpPr>
+          <p:nvPr>
+            <p:ph type="dt" idx="1"/>
+          </p:nvPr>
+        </p:nvSpPr>
+        <p:spPr>
+          <a:xfrm>
+            <a:off x="3884613" y="0"/>
+            <a:ext cx="2971800" cy="458788"/>
+          </a:xfrm>
+          <a:prstGeom prst="rect">
+            <a:avLst/>
+          </a:prstGeom>
+        </p:spPr>
+        <p:txBody>
+          <a:bodyPr vert="horz" lIns="91440" tIns="45720" rIns="91440" bIns="45720" rtlCol="0"/>
+          <a:lstStyle>
+            <a:lvl1pPr algn="r">
+              <a:defRPr sz="1200"/>
+            </a:lvl1pPr>
+          </a:lstStyle>
+          <a:p>
+            <a:fld id="{1A7751DD-74B8-4CD6-BFF6-6DAD8A813457}" type="datetimeFigureOut">
+              <a:rPr lang="en-US" smtClean="0"/>
+              <a:t>11/19/2025</a:t>
+            </a:fld>
+            <a:endParaRPr lang="en-US"/>
+          </a:p>
+        </p:txBody>
+      </p:sp>
+      <p:sp>
+        <p:nvSpPr>
+          <p:cNvPr id="4" name="Slide Image Placeholder 3"/>
+          <p:cNvSpPr>
+            <a:spLocks noGrp="1" noRot="1" noChangeAspect="1"/>
+          </p:cNvSpPr>
+          <p:nvPr>
+            <p:ph type="sldImg" idx="2"/>
+          </p:nvPr>
+        </p:nvSpPr>
+        <p:spPr>
+          <a:xfrm>
+            <a:off x="685800" y="1143000"/>
+            <a:ext cx="5486400" cy="3086100"/>
+          </a:xfrm>
+          <a:prstGeom prst="rect">
+            <a:avLst/>
+          </a:prstGeom>
+          <a:noFill/>
+          <a:ln w="12700">
+            <a:solidFill>
+              <a:prstClr val="black"/>
+            </a:solidFill>
+          </a:ln>
+        </p:spPr>
+        <p:txBody>
+          <a:bodyPr vert="horz" lIns="91440" tIns="45720" rIns="91440" bIns="45720" rtlCol="0" anchor="ctr"/>
+          <a:lstStyle/>
+          <a:p>
+            <a:endParaRPr lang="en-US"/>
+          </a:p>
+        </p:txBody>
+      </p:sp>
+      <p:sp>
+        <p:nvSpPr>
+          <p:cNvPr id="5" name="Notes Placeholder 4"/>
+          <p:cNvSpPr>
+            <a:spLocks noGrp="1"/>
+          </p:cNvSpPr>
+          <p:nvPr>
+            <p:ph type="body" sz="quarter" idx="3"/>
+          </p:nvPr>
+        </p:nvSpPr>
+        <p:spPr>
+          <a:xfrm>
+            <a:off x="685800" y="4400550"/>
+            <a:ext cx="5486400" cy="3600450"/>
+          </a:xfrm>
+          <a:prstGeom prst="rect">
+            <a:avLst/>
+          </a:prstGeom>
+        </p:spPr>
+        <p:txBody>
+          <a:bodyPr vert="horz" lIns="91440" tIns="45720" rIns="91440" bIns="45720" rtlCol="0"/>
+          <a:lstStyle/>
+          <a:p>
+            <a:pPr lvl="0"/>
+            <a:r>
+              <a:rPr lang="en-US"/>
+              <a:t>Click to edit Master text styles</a:t>
+            </a:r>
+          </a:p>
+          <a:p>
+            <a:pPr lvl="1"/>
+            <a:r>
+              <a:rPr lang="en-US"/>
+              <a:t>Second level</a:t>
+            </a:r>
+          </a:p>
+          <a:p>
+            <a:pPr lvl="2"/>
+            <a:r>
+              <a:rPr lang="en-US"/>
+              <a:t>Third level</a:t>
+            </a:r>
+          </a:p>
+          <a:p>
+            <a:pPr lvl="3"/>
+            <a:r>
+              <a:rPr lang="en-US"/>
+              <a:t>Fourth level</a:t>
+            </a:r>
+          </a:p>
+          <a:p>
+            <a:pPr lvl="4"/>
+            <a:r>
+              <a:rPr lang="en-US"/>
+              <a:t>Fifth level</a:t>
+            </a:r>
+          </a:p>
+        </p:txBody>
+      </p:sp>
+      <p:sp>
+        <p:nvSpPr>
+          <p:cNvPr id="6" name="Footer Placeholder 5"/>
+          <p:cNvSpPr>
+            <a:spLocks noGrp="1"/>
+          </p:cNvSpPr>
+          <p:nvPr>
+            <p:ph type="ftr" sz="quarter" idx="4"/>
+          </p:nvPr>
+        </p:nvSpPr>
+        <p:spPr>
+          <a:xfrm>
+            <a:off x="0" y="8685213"/>
+            <a:ext cx="2971800" cy="458787"/>
+          </a:xfrm>
+          <a:prstGeom prst="rect">
+            <a:avLst/>
+          </a:prstGeom>
+        </p:spPr>
+        <p:txBody>
+          <a:bodyPr vert="horz" lIns="91440" tIns="45720" rIns="91440" bIns="45720" rtlCol="0" anchor="b"/>
+          <a:lstStyle>
+            <a:lvl1pPr algn="l">
+              <a:defRPr sz="1200"/>
+            </a:lvl1pPr>
+          </a:lstStyle>
+          <a:p>
+            <a:endParaRPr lang="en-US"/>
+          </a:p>
+        </p:txBody>
+      </p:sp>
+      <p:sp>
+        <p:nvSpPr>
+          <p:cNvPr id="7" name="Slide Number Placeholder 6"/>
+          <p:cNvSpPr>
+            <a:spLocks noGrp="1"/>
+          </p:cNvSpPr>
+          <p:nvPr>
+            <p:ph type="sldNum" sz="quarter" idx="5"/>
+          </p:nvPr>
+        </p:nvSpPr>
+        <p:spPr>
+          <a:xfrm>
+            <a:off x="3884613" y="8685213"/>
+            <a:ext cx="2971800" cy="458787"/>
+          </a:xfrm>
+          <a:prstGeom prst="rect">
+            <a:avLst/>
+          </a:prstGeom>
+        </p:spPr>
+        <p:txBody>
+          <a:bodyPr vert="horz" lIns="91440" tIns="45720" rIns="91440" bIns="45720" rtlCol="0" anchor="b"/>
+          <a:lstStyle>
+            <a:lvl1pPr algn="r">
+              <a:defRPr sz="1200"/>
+            </a:lvl1pPr>
+          </a:lstStyle>
+          <a:p>
+            <a:fld id="{3025A8E0-A27A-48B4-B626-142953AC4A06}" type="slidenum">
+              <a:rPr lang="en-US" smtClean="0"/>
+              <a:t>‹#›</a:t>
+            </a:fld>
+            <a:endParaRPr lang="en-US"/>
+          </a:p>
+        </p:txBody>
+      </p:sp>
+    </p:spTree>
+    <p:extLst>
+      <p:ext uri="{BB962C8B-B14F-4D97-AF65-F5344CB8AC3E}">
+        <p14:creationId xmlns:p14="http://schemas.microsoft.com/office/powerpoint/2010/main" val="3511806251"/>
+      </p:ext>
+    </p:extLst>
+  </p:cSld>
+  <p:clrMap bg1="lt1" tx1="dk1" bg2="lt2" tx2="dk2" accent1="accent1" accent2="accent2" accent3="accent3" accent4="accent4" accent5="accent5" accent6="accent6" hlink="hlink" folHlink="folHlink"/>
+  <p:notesStyle>
+    <a:lvl1pPr marL="0" algn="l" defTabSz="914400" rtl="0" eaLnBrk="1" latinLnBrk="0" hangingPunct="1">
+      <a:defRPr sz="1200" kern="1200">
+        <a:solidFill>
+          <a:schemeClr val="tx1"/>
+        </a:solidFill>
+        <a:latin typeface="+mn-lt"/>
+        <a:ea typeface="+mn-ea"/>
+        <a:cs typeface="+mn-cs"/>
+      </a:defRPr>
+    </a:lvl1pPr>
+    <a:lvl2pPr marL="457200" algn="l" defTabSz="914400" rtl="0" eaLnBrk="1" latinLnBrk="0" hangingPunct="1">
+      <a:defRPr sz="1200" kern="1200">
+        <a:solidFill>
+          <a:schemeClr val="tx1"/>
+        </a:solidFill>
+        <a:latin typeface="+mn-lt"/>
+        <a:ea typeface="+mn-ea"/>
+        <a:cs typeface="+mn-cs"/>
+      </a:defRPr>
+    </a:lvl2pPr>
+    <a:lvl3pPr marL="914400" algn="l" defTabSz="914400" rtl="0" eaLnBrk="1" latinLnBrk="0" hangingPunct="1">
+      <a:defRPr sz="1200" kern="1200">
+        <a:solidFill>
+          <a:schemeClr val="tx1"/>
+        </a:solidFill>
+        <a:latin typeface="+mn-lt"/>
+        <a:ea typeface="+mn-ea"/>
+        <a:cs typeface="+mn-cs"/>
+      </a:defRPr>
+    </a:lvl3pPr>
+    <a:lvl4pPr marL="1371600" algn="l" defTabSz="914400" rtl="0" eaLnBrk="1" latinLnBrk="0" hangingPunct="1">
+      <a:defRPr sz="1200" kern="1200">
+        <a:solidFill>
+          <a:schemeClr val="tx1"/>
+        </a:solidFill>
+        <a:latin typeface="+mn-lt"/>
+        <a:ea typeface="+mn-ea"/>
+        <a:cs typeface="+mn-cs"/>
+      </a:defRPr>
+    </a:lvl4pPr>
+    <a:lvl5pPr marL="1828800" algn="l" defTabSz="914400" rtl="0" eaLnBrk="1" latinLnBrk="0" hangingPunct="1">
+      <a:defRPr sz="1200" kern="1200">
+        <a:solidFill>
+          <a:schemeClr val="tx1"/>
+        </a:solidFill>
+        <a:latin typeface="+mn-lt"/>
+        <a:ea typeface="+mn-ea"/>
+        <a:cs typeface="+mn-cs"/>
+      </a:defRPr>
+    </a:lvl5pPr>
+    <a:lvl6pPr marL="2286000" algn="l" defTabSz="914400" rtl="0" eaLnBrk="1" latinLnBrk="0" hangingPunct="1">
+      <a:defRPr sz="1200" kern="1200">
+        <a:solidFill>
+          <a:schemeClr val="tx1"/>
+        </a:solidFill>
+        <a:latin typeface="+mn-lt"/>
+        <a:ea typeface="+mn-ea"/>
+        <a:cs typeface="+mn-cs"/>
+      </a:defRPr>
+    </a:lvl6pPr>
+    <a:lvl7pPr marL="2743200" algn="l" defTabSz="914400" rtl="0" eaLnBrk="1" latinLnBrk="0" hangingPunct="1">
+      <a:defRPr sz="1200" kern="1200">
+        <a:solidFill>
+          <a:schemeClr val="tx1"/>
+        </a:solidFill>
+        <a:latin typeface="+mn-lt"/>
+        <a:ea typeface="+mn-ea"/>
+        <a:cs typeface="+mn-cs"/>
+      </a:defRPr>
+    </a:lvl7pPr>
+    <a:lvl8pPr marL="3200400" algn="l" defTabSz="914400" rtl="0" eaLnBrk="1" latinLnBrk="0" hangingPunct="1">
+      <a:defRPr sz="1200" kern="1200">
+        <a:solidFill>
+          <a:schemeClr val="tx1"/>
+        </a:solidFill>
+        <a:latin typeface="+mn-lt"/>
+        <a:ea typeface="+mn-ea"/>
+        <a:cs typeface="+mn-cs"/>
+      </a:defRPr>
+    </a:lvl8pPr>
+    <a:lvl9pPr marL="3657600" algn="l" defTabSz="914400" rtl="0" eaLnBrk="1" latinLnBrk="0" hangingPunct="1">
+      <a:defRPr sz="1200" kern="1200">
+        <a:solidFill>
+          <a:schemeClr val="tx1"/>
+        </a:solidFill>
+        <a:latin typeface="+mn-lt"/>
+        <a:ea typeface="+mn-ea"/>
+        <a:cs typeface="+mn-cs"/>
+      </a:defRPr>
+    </a:lvl9pPr>
+  </p:notesStyle>
+</p:notesMaster>
+</file>
+
+<file path=ppt/notesSlides/notesSlide1.xml><?xml version="1.0" encoding="utf-8"?>
+<p:notes xmlns:a="http://schemas.openxmlformats.org/drawingml/2006/main" xmlns:r="http://schemas.openxmlformats.org/officeDocument/2006/relationships" xmlns:p="http://schemas.openxmlformats.org/presentationml/2006/main">
+  <p:cSld>
+    <p:spTree>
+      <p:nvGrpSpPr>
+        <p:cNvPr id="1" name=""/>
+        <p:cNvGrpSpPr/>
+        <p:nvPr/>
+      </p:nvGrpSpPr>
+      <p:grpSpPr>
+        <a:xfrm>
+          <a:off x="0" y="0"/>
+          <a:ext cx="0" cy="0"/>
+          <a:chOff x="0" y="0"/>
+          <a:chExt cx="0" cy="0"/>
+        </a:xfrm>
+      </p:grpSpPr>
+      <p:sp>
+        <p:nvSpPr>
+          <p:cNvPr id="2" name="Slide Image Placeholder 1"/>
+          <p:cNvSpPr>
+            <a:spLocks noGrp="1" noRot="1" noChangeAspect="1"/>
+          </p:cNvSpPr>
+          <p:nvPr>
+            <p:ph type="sldImg"/>
+          </p:nvPr>
+        </p:nvSpPr>
+        <p:spPr/>
+      </p:sp>
+      <p:sp>
+        <p:nvSpPr>
+          <p:cNvPr id="3" name="Notes Placeholder 2"/>
+          <p:cNvSpPr>
+            <a:spLocks noGrp="1"/>
+          </p:cNvSpPr>
+          <p:nvPr>
+            <p:ph type="body" idx="1"/>
+          </p:nvPr>
+        </p:nvSpPr>
+        <p:spPr/>
+        <p:txBody>
+          <a:bodyPr/>
+          <a:lstStyle/>
+          <a:p>
+            <a:r>
+              <a:rPr lang="en-US"/>
+              <a:t>It’s simple, there is too many movies out there which go under the radar. We don’t want to waste the few free hours we have watching a bad movie.</a:t>
+            </a:r>
+          </a:p>
+        </p:txBody>
+      </p:sp>
+      <p:sp>
+        <p:nvSpPr>
+          <p:cNvPr id="4" name="Slide Number Placeholder 3"/>
+          <p:cNvSpPr>
+            <a:spLocks noGrp="1"/>
+          </p:cNvSpPr>
+          <p:nvPr>
+            <p:ph type="sldNum" sz="quarter" idx="5"/>
+          </p:nvPr>
+        </p:nvSpPr>
+        <p:spPr/>
+        <p:txBody>
+          <a:bodyPr/>
+          <a:lstStyle/>
+          <a:p>
+            <a:fld id="{3025A8E0-A27A-48B4-B626-142953AC4A06}" type="slidenum">
+              <a:rPr lang="en-US" smtClean="0"/>
+              <a:t>4</a:t>
+            </a:fld>
+            <a:endParaRPr lang="en-US"/>
+          </a:p>
+        </p:txBody>
+      </p:sp>
+    </p:spTree>
+    <p:extLst>
+      <p:ext uri="{BB962C8B-B14F-4D97-AF65-F5344CB8AC3E}">
+        <p14:creationId xmlns:p14="http://schemas.microsoft.com/office/powerpoint/2010/main" val="3771049207"/>
+      </p:ext>
+    </p:extLst>
+  </p:cSld>
+  <p:clrMapOvr>
+    <a:masterClrMapping/>
+  </p:clrMapOvr>
+</p:notes>
+</file>
+
+<file path=ppt/notesSlides/notesSlide2.xml><?xml version="1.0" encoding="utf-8"?>
+<p:notes xmlns:a="http://schemas.openxmlformats.org/drawingml/2006/main" xmlns:r="http://schemas.openxmlformats.org/officeDocument/2006/relationships" xmlns:p="http://schemas.openxmlformats.org/presentationml/2006/main">
+  <p:cSld>
+    <p:spTree>
+      <p:nvGrpSpPr>
+        <p:cNvPr id="1" name=""/>
+        <p:cNvGrpSpPr/>
+        <p:nvPr/>
+      </p:nvGrpSpPr>
+      <p:grpSpPr>
+        <a:xfrm>
+          <a:off x="0" y="0"/>
+          <a:ext cx="0" cy="0"/>
+          <a:chOff x="0" y="0"/>
+          <a:chExt cx="0" cy="0"/>
+        </a:xfrm>
+      </p:grpSpPr>
+      <p:sp>
+        <p:nvSpPr>
+          <p:cNvPr id="2" name="Slide Image Placeholder 1"/>
+          <p:cNvSpPr>
+            <a:spLocks noGrp="1" noRot="1" noChangeAspect="1"/>
+          </p:cNvSpPr>
+          <p:nvPr>
+            <p:ph type="sldImg"/>
+          </p:nvPr>
+        </p:nvSpPr>
+        <p:spPr/>
+      </p:sp>
+      <p:sp>
+        <p:nvSpPr>
+          <p:cNvPr id="3" name="Notes Placeholder 2"/>
+          <p:cNvSpPr>
+            <a:spLocks noGrp="1"/>
+          </p:cNvSpPr>
+          <p:nvPr>
+            <p:ph type="body" idx="1"/>
+          </p:nvPr>
+        </p:nvSpPr>
+        <p:spPr/>
+        <p:txBody>
+          <a:bodyPr/>
+          <a:lstStyle/>
+          <a:p>
+            <a:r>
+              <a:rPr lang="en-US"/>
+              <a:t>AI! Instead of spending endless time searching for new movies. We can use AI Machine Learning to find good matches based on a users’ likes!</a:t>
+            </a:r>
+          </a:p>
+          <a:p>
+            <a:r>
+              <a:rPr lang="en-US"/>
+              <a:t>This project seeks to solve the problem of content overload by delivering accurate, personalized movie recommendations that improve user experience, reduce browsing time, and enhance overall satisfaction.</a:t>
+            </a:r>
+          </a:p>
+        </p:txBody>
+      </p:sp>
+      <p:sp>
+        <p:nvSpPr>
+          <p:cNvPr id="4" name="Slide Number Placeholder 3"/>
+          <p:cNvSpPr>
+            <a:spLocks noGrp="1"/>
+          </p:cNvSpPr>
+          <p:nvPr>
+            <p:ph type="sldNum" sz="quarter" idx="5"/>
+          </p:nvPr>
+        </p:nvSpPr>
+        <p:spPr/>
+        <p:txBody>
+          <a:bodyPr/>
+          <a:lstStyle/>
+          <a:p>
+            <a:fld id="{3025A8E0-A27A-48B4-B626-142953AC4A06}" type="slidenum">
+              <a:rPr lang="en-US" smtClean="0"/>
+              <a:t>5</a:t>
+            </a:fld>
+            <a:endParaRPr lang="en-US"/>
+          </a:p>
+        </p:txBody>
+      </p:sp>
+    </p:spTree>
+    <p:extLst>
+      <p:ext uri="{BB962C8B-B14F-4D97-AF65-F5344CB8AC3E}">
+        <p14:creationId xmlns:p14="http://schemas.microsoft.com/office/powerpoint/2010/main" val="4059667075"/>
+      </p:ext>
+    </p:extLst>
+  </p:cSld>
+  <p:clrMapOvr>
+    <a:masterClrMapping/>
+  </p:clrMapOvr>
+</p:notes>
+</file>
+
+<file path=ppt/notesSlides/notesSlide3.xml><?xml version="1.0" encoding="utf-8"?>
+<p:notes xmlns:a="http://schemas.openxmlformats.org/drawingml/2006/main" xmlns:r="http://schemas.openxmlformats.org/officeDocument/2006/relationships" xmlns:p="http://schemas.openxmlformats.org/presentationml/2006/main">
+  <p:cSld>
+    <p:spTree>
+      <p:nvGrpSpPr>
+        <p:cNvPr id="1" name=""/>
+        <p:cNvGrpSpPr/>
+        <p:nvPr/>
+      </p:nvGrpSpPr>
+      <p:grpSpPr>
+        <a:xfrm>
+          <a:off x="0" y="0"/>
+          <a:ext cx="0" cy="0"/>
+          <a:chOff x="0" y="0"/>
+          <a:chExt cx="0" cy="0"/>
+        </a:xfrm>
+      </p:grpSpPr>
+      <p:sp>
+        <p:nvSpPr>
+          <p:cNvPr id="2" name="Slide Image Placeholder 1"/>
+          <p:cNvSpPr>
+            <a:spLocks noGrp="1" noRot="1" noChangeAspect="1"/>
+          </p:cNvSpPr>
+          <p:nvPr>
+            <p:ph type="sldImg"/>
+          </p:nvPr>
+        </p:nvSpPr>
+        <p:spPr/>
+      </p:sp>
+      <p:sp>
+        <p:nvSpPr>
+          <p:cNvPr id="3" name="Notes Placeholder 2"/>
+          <p:cNvSpPr>
+            <a:spLocks noGrp="1"/>
+          </p:cNvSpPr>
+          <p:nvPr>
+            <p:ph type="body" idx="1"/>
+          </p:nvPr>
+        </p:nvSpPr>
+        <p:spPr/>
+        <p:txBody>
+          <a:bodyPr/>
+          <a:lstStyle/>
+          <a:p>
+            <a:r>
+              <a:rPr lang="en-US"/>
+              <a:t>This script trains a </a:t>
+            </a:r>
+            <a:r>
+              <a:rPr lang="en-US" b="1"/>
+              <a:t>movie recommendation model</a:t>
+            </a:r>
+            <a:r>
+              <a:rPr lang="en-US"/>
+              <a:t> using </a:t>
+            </a:r>
+            <a:r>
+              <a:rPr lang="en-US" b="1"/>
+              <a:t>SVD (Singular Value Decomposition)</a:t>
+            </a:r>
+            <a:r>
+              <a:rPr lang="en-US"/>
+              <a:t> from the </a:t>
+            </a:r>
+            <a:r>
+              <a:rPr lang="en-US" sz="1200" kern="1200">
+                <a:solidFill>
+                  <a:schemeClr val="tx1"/>
+                </a:solidFill>
+                <a:latin typeface="+mn-lt"/>
+                <a:ea typeface="+mn-ea"/>
+                <a:cs typeface="+mn-cs"/>
+              </a:rPr>
+              <a:t>surprise</a:t>
+            </a:r>
+            <a:r>
+              <a:rPr lang="en-US"/>
+              <a:t> ML library.</a:t>
+            </a:r>
+            <a:br>
+              <a:rPr lang="en-US"/>
+            </a:br>
+            <a:r>
+              <a:rPr lang="en-US"/>
+              <a:t>It learns which movies users </a:t>
+            </a:r>
+            <a:r>
+              <a:rPr lang="en-US" i="1"/>
+              <a:t>might</a:t>
+            </a:r>
+            <a:r>
+              <a:rPr lang="en-US"/>
+              <a:t> like based on what they already liked.</a:t>
+            </a:r>
+          </a:p>
+          <a:p>
+            <a:r>
+              <a:rPr lang="en-US"/>
+              <a:t>Then it saves predicted recommendations into a </a:t>
+            </a:r>
+            <a:r>
+              <a:rPr lang="en-US" err="1"/>
+              <a:t>Supabase</a:t>
+            </a:r>
+            <a:r>
+              <a:rPr lang="en-US"/>
+              <a:t> table.</a:t>
+            </a:r>
+          </a:p>
+          <a:p>
+            <a:endParaRPr lang="en-US"/>
+          </a:p>
+        </p:txBody>
+      </p:sp>
+      <p:sp>
+        <p:nvSpPr>
+          <p:cNvPr id="4" name="Slide Number Placeholder 3"/>
+          <p:cNvSpPr>
+            <a:spLocks noGrp="1"/>
+          </p:cNvSpPr>
+          <p:nvPr>
+            <p:ph type="sldNum" sz="quarter" idx="5"/>
+          </p:nvPr>
+        </p:nvSpPr>
+        <p:spPr/>
+        <p:txBody>
+          <a:bodyPr/>
+          <a:lstStyle/>
+          <a:p>
+            <a:fld id="{3025A8E0-A27A-48B4-B626-142953AC4A06}" type="slidenum">
+              <a:rPr lang="en-US" smtClean="0"/>
+              <a:t>6</a:t>
+            </a:fld>
+            <a:endParaRPr lang="en-US"/>
+          </a:p>
+        </p:txBody>
+      </p:sp>
+    </p:spTree>
+    <p:extLst>
+      <p:ext uri="{BB962C8B-B14F-4D97-AF65-F5344CB8AC3E}">
+        <p14:creationId xmlns:p14="http://schemas.microsoft.com/office/powerpoint/2010/main" val="3081033999"/>
+      </p:ext>
+    </p:extLst>
+  </p:cSld>
+  <p:clrMapOvr>
+    <a:masterClrMapping/>
+  </p:clrMapOvr>
+</p:notes>
+</file>
+
+<file path=ppt/notesSlides/notesSlide4.xml><?xml version="1.0" encoding="utf-8"?>
+<p:notes xmlns:a="http://schemas.openxmlformats.org/drawingml/2006/main" xmlns:r="http://schemas.openxmlformats.org/officeDocument/2006/relationships" xmlns:p="http://schemas.openxmlformats.org/presentationml/2006/main">
+  <p:cSld>
+    <p:spTree>
+      <p:nvGrpSpPr>
+        <p:cNvPr id="1" name=""/>
+        <p:cNvGrpSpPr/>
+        <p:nvPr/>
+      </p:nvGrpSpPr>
+      <p:grpSpPr>
+        <a:xfrm>
+          <a:off x="0" y="0"/>
+          <a:ext cx="0" cy="0"/>
+          <a:chOff x="0" y="0"/>
+          <a:chExt cx="0" cy="0"/>
+        </a:xfrm>
+      </p:grpSpPr>
+      <p:sp>
+        <p:nvSpPr>
+          <p:cNvPr id="2" name="Slide Image Placeholder 1"/>
+          <p:cNvSpPr>
+            <a:spLocks noGrp="1" noRot="1" noChangeAspect="1"/>
+          </p:cNvSpPr>
+          <p:nvPr>
+            <p:ph type="sldImg"/>
+          </p:nvPr>
+        </p:nvSpPr>
+        <p:spPr/>
+      </p:sp>
+      <p:sp>
+        <p:nvSpPr>
+          <p:cNvPr id="3" name="Notes Placeholder 2"/>
+          <p:cNvSpPr>
+            <a:spLocks noGrp="1"/>
+          </p:cNvSpPr>
+          <p:nvPr>
+            <p:ph type="body" idx="1"/>
+          </p:nvPr>
+        </p:nvSpPr>
+        <p:spPr/>
+        <p:txBody>
+          <a:bodyPr/>
+          <a:lstStyle/>
+          <a:p>
+            <a:r>
+              <a:rPr lang="en-US"/>
+              <a:t>5. This is the AI part.</a:t>
+            </a:r>
+          </a:p>
+          <a:p>
+            <a:r>
+              <a:rPr lang="en-US" b="1"/>
+              <a:t>What SVD does:</a:t>
+            </a:r>
+          </a:p>
+          <a:p>
+            <a:r>
+              <a:rPr lang="en-US"/>
+              <a:t>Treats the user/movie matrix like a huge grid.</a:t>
+            </a:r>
+          </a:p>
+          <a:p>
+            <a:r>
+              <a:rPr lang="en-US"/>
+              <a:t>Learns hidden relationships between:</a:t>
+            </a:r>
+          </a:p>
+          <a:p>
+            <a:pPr lvl="1"/>
+            <a:r>
+              <a:rPr lang="en-US"/>
+              <a:t>users</a:t>
+            </a:r>
+          </a:p>
+          <a:p>
+            <a:pPr lvl="1"/>
+            <a:r>
+              <a:rPr lang="en-US"/>
+              <a:t>movies</a:t>
+            </a:r>
+          </a:p>
+          <a:p>
+            <a:pPr lvl="1"/>
+            <a:r>
+              <a:rPr lang="en-US"/>
+              <a:t>user preferences</a:t>
+            </a:r>
+          </a:p>
+          <a:p>
+            <a:r>
+              <a:rPr lang="en-US"/>
+              <a:t>Learns </a:t>
+            </a:r>
+            <a:r>
+              <a:rPr lang="en-US" i="1"/>
+              <a:t>latent factors</a:t>
+            </a:r>
+            <a:r>
+              <a:rPr lang="en-US"/>
+              <a:t> like:</a:t>
+            </a:r>
+          </a:p>
+          <a:p>
+            <a:pPr lvl="1"/>
+            <a:r>
+              <a:rPr lang="en-US"/>
+              <a:t>“user likes action”</a:t>
+            </a:r>
+          </a:p>
+          <a:p>
+            <a:pPr lvl="1"/>
+            <a:r>
+              <a:rPr lang="en-US"/>
+              <a:t>“movie is comedy”</a:t>
+            </a:r>
+          </a:p>
+          <a:p>
+            <a:pPr lvl="1"/>
+            <a:r>
+              <a:rPr lang="en-US"/>
+              <a:t>“user likes Marvel-like movies”</a:t>
+            </a:r>
+          </a:p>
+          <a:p>
+            <a:r>
+              <a:rPr lang="en-US"/>
+              <a:t>The model attempts to fill in missing values ("what rating would user X give movie Y?").</a:t>
+            </a:r>
+          </a:p>
+          <a:p>
+            <a:r>
+              <a:rPr lang="en-US"/>
+              <a:t>This is </a:t>
+            </a:r>
+            <a:r>
+              <a:rPr lang="en-US" b="1"/>
+              <a:t>collaborative filtering</a:t>
+            </a:r>
+            <a:r>
+              <a:rPr lang="en-US"/>
+              <a:t>.</a:t>
+            </a:r>
+          </a:p>
+          <a:p>
+            <a:endParaRPr lang="en-US"/>
+          </a:p>
+        </p:txBody>
+      </p:sp>
+      <p:sp>
+        <p:nvSpPr>
+          <p:cNvPr id="4" name="Slide Number Placeholder 3"/>
+          <p:cNvSpPr>
+            <a:spLocks noGrp="1"/>
+          </p:cNvSpPr>
+          <p:nvPr>
+            <p:ph type="sldNum" sz="quarter" idx="5"/>
+          </p:nvPr>
+        </p:nvSpPr>
+        <p:spPr/>
+        <p:txBody>
+          <a:bodyPr/>
+          <a:lstStyle/>
+          <a:p>
+            <a:fld id="{3025A8E0-A27A-48B4-B626-142953AC4A06}" type="slidenum">
+              <a:rPr lang="en-US" smtClean="0"/>
+              <a:t>7</a:t>
+            </a:fld>
+            <a:endParaRPr lang="en-US"/>
+          </a:p>
+        </p:txBody>
+      </p:sp>
+    </p:spTree>
+    <p:extLst>
+      <p:ext uri="{BB962C8B-B14F-4D97-AF65-F5344CB8AC3E}">
+        <p14:creationId xmlns:p14="http://schemas.microsoft.com/office/powerpoint/2010/main" val="1219515548"/>
+      </p:ext>
+    </p:extLst>
+  </p:cSld>
+  <p:clrMapOvr>
+    <a:masterClrMapping/>
+  </p:clrMapOvr>
+</p:notes>
 </file>
 
 <file path=ppt/slideLayouts/slideLayout1.xml><?xml version="1.0" encoding="utf-8"?>
@@ -443,7 +1602,7 @@
           <a:p>
             <a:fld id="{7D92D934-C1E1-4F35-8ECC-9972AA97D066}" type="datetimeFigureOut">
               <a:rPr lang="en-US" smtClean="0"/>
-              <a:t>11/12/2025</a:t>
+              <a:t>11/19/2025</a:t>
             </a:fld>
             <a:endParaRPr lang="en-US"/>
           </a:p>
@@ -641,7 +1800,7 @@
           <a:p>
             <a:fld id="{7D92D934-C1E1-4F35-8ECC-9972AA97D066}" type="datetimeFigureOut">
               <a:rPr lang="en-US" smtClean="0"/>
-              <a:t>11/12/2025</a:t>
+              <a:t>11/19/2025</a:t>
             </a:fld>
             <a:endParaRPr lang="en-US"/>
           </a:p>
@@ -849,7 +2008,7 @@
           <a:p>
             <a:fld id="{7D92D934-C1E1-4F35-8ECC-9972AA97D066}" type="datetimeFigureOut">
               <a:rPr lang="en-US" smtClean="0"/>
-              <a:t>11/12/2025</a:t>
+              <a:t>11/19/2025</a:t>
             </a:fld>
             <a:endParaRPr lang="en-US"/>
           </a:p>
@@ -1047,7 +2206,7 @@
           <a:p>
             <a:fld id="{7D92D934-C1E1-4F35-8ECC-9972AA97D066}" type="datetimeFigureOut">
               <a:rPr lang="en-US" smtClean="0"/>
-              <a:t>11/12/2025</a:t>
+              <a:t>11/19/2025</a:t>
             </a:fld>
             <a:endParaRPr lang="en-US"/>
           </a:p>
@@ -1322,7 +2481,7 @@
           <a:p>
             <a:fld id="{7D92D934-C1E1-4F35-8ECC-9972AA97D066}" type="datetimeFigureOut">
               <a:rPr lang="en-US" smtClean="0"/>
-              <a:t>11/12/2025</a:t>
+              <a:t>11/19/2025</a:t>
             </a:fld>
             <a:endParaRPr lang="en-US"/>
           </a:p>
@@ -1587,7 +2746,7 @@
           <a:p>
             <a:fld id="{7D92D934-C1E1-4F35-8ECC-9972AA97D066}" type="datetimeFigureOut">
               <a:rPr lang="en-US" smtClean="0"/>
-              <a:t>11/12/2025</a:t>
+              <a:t>11/19/2025</a:t>
             </a:fld>
             <a:endParaRPr lang="en-US"/>
           </a:p>
@@ -1999,7 +3158,7 @@
           <a:p>
             <a:fld id="{7D92D934-C1E1-4F35-8ECC-9972AA97D066}" type="datetimeFigureOut">
               <a:rPr lang="en-US" smtClean="0"/>
-              <a:t>11/12/2025</a:t>
+              <a:t>11/19/2025</a:t>
             </a:fld>
             <a:endParaRPr lang="en-US"/>
           </a:p>
@@ -2140,7 +3299,7 @@
           <a:p>
             <a:fld id="{7D92D934-C1E1-4F35-8ECC-9972AA97D066}" type="datetimeFigureOut">
               <a:rPr lang="en-US" smtClean="0"/>
-              <a:t>11/12/2025</a:t>
+              <a:t>11/19/2025</a:t>
             </a:fld>
             <a:endParaRPr lang="en-US"/>
           </a:p>
@@ -2253,7 +3412,7 @@
           <a:p>
             <a:fld id="{7D92D934-C1E1-4F35-8ECC-9972AA97D066}" type="datetimeFigureOut">
               <a:rPr lang="en-US" smtClean="0"/>
-              <a:t>11/12/2025</a:t>
+              <a:t>11/19/2025</a:t>
             </a:fld>
             <a:endParaRPr lang="en-US"/>
           </a:p>
@@ -2564,7 +3723,7 @@
           <a:p>
             <a:fld id="{7D92D934-C1E1-4F35-8ECC-9972AA97D066}" type="datetimeFigureOut">
               <a:rPr lang="en-US" smtClean="0"/>
-              <a:t>11/12/2025</a:t>
+              <a:t>11/19/2025</a:t>
             </a:fld>
             <a:endParaRPr lang="en-US"/>
           </a:p>
@@ -2852,7 +4011,7 @@
           <a:p>
             <a:fld id="{7D92D934-C1E1-4F35-8ECC-9972AA97D066}" type="datetimeFigureOut">
               <a:rPr lang="en-US" smtClean="0"/>
-              <a:t>11/12/2025</a:t>
+              <a:t>11/19/2025</a:t>
             </a:fld>
             <a:endParaRPr lang="en-US"/>
           </a:p>
@@ -3093,7 +4252,7 @@
           <a:p>
             <a:fld id="{7D92D934-C1E1-4F35-8ECC-9972AA97D066}" type="datetimeFigureOut">
               <a:rPr lang="en-US" smtClean="0"/>
-              <a:t>11/12/2025</a:t>
+              <a:t>11/19/2025</a:t>
             </a:fld>
             <a:endParaRPr lang="en-US"/>
           </a:p>
@@ -3577,6 +4736,219 @@
 </p:sld>
 </file>
 
+<file path=ppt/slides/slide10.xml><?xml version="1.0" encoding="utf-8"?>
+<p:sld xmlns:a="http://schemas.openxmlformats.org/drawingml/2006/main" xmlns:r="http://schemas.openxmlformats.org/officeDocument/2006/relationships" xmlns:p="http://schemas.openxmlformats.org/presentationml/2006/main">
+  <p:cSld>
+    <p:spTree>
+      <p:nvGrpSpPr>
+        <p:cNvPr id="1" name=""/>
+        <p:cNvGrpSpPr/>
+        <p:nvPr/>
+      </p:nvGrpSpPr>
+      <p:grpSpPr>
+        <a:xfrm>
+          <a:off x="0" y="0"/>
+          <a:ext cx="0" cy="0"/>
+          <a:chOff x="0" y="0"/>
+          <a:chExt cx="0" cy="0"/>
+        </a:xfrm>
+      </p:grpSpPr>
+      <p:sp>
+        <p:nvSpPr>
+          <p:cNvPr id="2" name="Title 1">
+            <a:extLst>
+              <a:ext uri="{FF2B5EF4-FFF2-40B4-BE49-F238E27FC236}">
+                <a16:creationId xmlns:a16="http://schemas.microsoft.com/office/drawing/2014/main" id="{B678E253-B61B-D448-65D1-6310696939B1}"/>
+              </a:ext>
+            </a:extLst>
+          </p:cNvPr>
+          <p:cNvSpPr>
+            <a:spLocks noGrp="1"/>
+          </p:cNvSpPr>
+          <p:nvPr>
+            <p:ph type="title"/>
+          </p:nvPr>
+        </p:nvSpPr>
+        <p:spPr/>
+        <p:txBody>
+          <a:bodyPr/>
+          <a:lstStyle/>
+          <a:p>
+            <a:r>
+              <a:rPr lang="en-US"/>
+              <a:t>Thank you for listening</a:t>
+            </a:r>
+          </a:p>
+        </p:txBody>
+      </p:sp>
+      <p:sp>
+        <p:nvSpPr>
+          <p:cNvPr id="3" name="Content Placeholder 2">
+            <a:extLst>
+              <a:ext uri="{FF2B5EF4-FFF2-40B4-BE49-F238E27FC236}">
+                <a16:creationId xmlns:a16="http://schemas.microsoft.com/office/drawing/2014/main" id="{78A205BC-D0D5-B0D3-6029-D27969668505}"/>
+              </a:ext>
+            </a:extLst>
+          </p:cNvPr>
+          <p:cNvSpPr>
+            <a:spLocks noGrp="1"/>
+          </p:cNvSpPr>
+          <p:nvPr>
+            <p:ph idx="1"/>
+          </p:nvPr>
+        </p:nvSpPr>
+        <p:spPr/>
+        <p:txBody>
+          <a:bodyPr/>
+          <a:lstStyle/>
+          <a:p>
+            <a:endParaRPr lang="en-US"/>
+          </a:p>
+        </p:txBody>
+      </p:sp>
+    </p:spTree>
+    <p:extLst>
+      <p:ext uri="{BB962C8B-B14F-4D97-AF65-F5344CB8AC3E}">
+        <p14:creationId xmlns:p14="http://schemas.microsoft.com/office/powerpoint/2010/main" val="3235235595"/>
+      </p:ext>
+    </p:extLst>
+  </p:cSld>
+  <p:clrMapOvr>
+    <a:masterClrMapping/>
+  </p:clrMapOvr>
+</p:sld>
+</file>
+
+<file path=ppt/slides/slide11.xml><?xml version="1.0" encoding="utf-8"?>
+<p:sld xmlns:a="http://schemas.openxmlformats.org/drawingml/2006/main" xmlns:r="http://schemas.openxmlformats.org/officeDocument/2006/relationships" xmlns:p="http://schemas.openxmlformats.org/presentationml/2006/main">
+  <p:cSld>
+    <p:spTree>
+      <p:nvGrpSpPr>
+        <p:cNvPr id="1" name=""/>
+        <p:cNvGrpSpPr/>
+        <p:nvPr/>
+      </p:nvGrpSpPr>
+      <p:grpSpPr>
+        <a:xfrm>
+          <a:off x="0" y="0"/>
+          <a:ext cx="0" cy="0"/>
+          <a:chOff x="0" y="0"/>
+          <a:chExt cx="0" cy="0"/>
+        </a:xfrm>
+      </p:grpSpPr>
+      <p:sp>
+        <p:nvSpPr>
+          <p:cNvPr id="2" name="Title 1">
+            <a:extLst>
+              <a:ext uri="{FF2B5EF4-FFF2-40B4-BE49-F238E27FC236}">
+                <a16:creationId xmlns:a16="http://schemas.microsoft.com/office/drawing/2014/main" id="{333DCC2F-63C6-155E-2F14-ECA88B217974}"/>
+              </a:ext>
+            </a:extLst>
+          </p:cNvPr>
+          <p:cNvSpPr>
+            <a:spLocks noGrp="1"/>
+          </p:cNvSpPr>
+          <p:nvPr>
+            <p:ph type="title"/>
+          </p:nvPr>
+        </p:nvSpPr>
+        <p:spPr/>
+        <p:txBody>
+          <a:bodyPr/>
+          <a:lstStyle/>
+          <a:p>
+            <a:r>
+              <a:rPr lang="en-US"/>
+              <a:t>Questions?</a:t>
+            </a:r>
+          </a:p>
+        </p:txBody>
+      </p:sp>
+      <p:sp>
+        <p:nvSpPr>
+          <p:cNvPr id="3" name="Content Placeholder 2">
+            <a:extLst>
+              <a:ext uri="{FF2B5EF4-FFF2-40B4-BE49-F238E27FC236}">
+                <a16:creationId xmlns:a16="http://schemas.microsoft.com/office/drawing/2014/main" id="{CA21D293-01F4-83D1-4E76-EF3B5C59F821}"/>
+              </a:ext>
+            </a:extLst>
+          </p:cNvPr>
+          <p:cNvSpPr>
+            <a:spLocks noGrp="1"/>
+          </p:cNvSpPr>
+          <p:nvPr>
+            <p:ph idx="1"/>
+          </p:nvPr>
+        </p:nvSpPr>
+        <p:spPr/>
+        <p:txBody>
+          <a:bodyPr/>
+          <a:lstStyle/>
+          <a:p>
+            <a:endParaRPr lang="en-US"/>
+          </a:p>
+        </p:txBody>
+      </p:sp>
+      <p:pic>
+        <p:nvPicPr>
+          <p:cNvPr id="2050" name="Picture 2" descr="21 Questions Game: 180+ Best Questions You'll Ever Ask |">
+            <a:extLst>
+              <a:ext uri="{FF2B5EF4-FFF2-40B4-BE49-F238E27FC236}">
+                <a16:creationId xmlns:a16="http://schemas.microsoft.com/office/drawing/2014/main" id="{A87193E6-C65C-A50E-E65A-9A5F30A748AD}"/>
+              </a:ext>
+            </a:extLst>
+          </p:cNvPr>
+          <p:cNvPicPr>
+            <a:picLocks noChangeAspect="1" noChangeArrowheads="1"/>
+          </p:cNvPicPr>
+          <p:nvPr/>
+        </p:nvPicPr>
+        <p:blipFill>
+          <a:blip r:embed="rId2">
+            <a:extLst>
+              <a:ext uri="{28A0092B-C50C-407E-A947-70E740481C1C}">
+                <a14:useLocalDpi xmlns:a14="http://schemas.microsoft.com/office/drawing/2010/main" val="0"/>
+              </a:ext>
+            </a:extLst>
+          </a:blip>
+          <a:srcRect/>
+          <a:stretch>
+            <a:fillRect/>
+          </a:stretch>
+        </p:blipFill>
+        <p:spPr bwMode="auto">
+          <a:xfrm>
+            <a:off x="-511969" y="0"/>
+            <a:ext cx="13215937" cy="6872287"/>
+          </a:xfrm>
+          <a:prstGeom prst="rect">
+            <a:avLst/>
+          </a:prstGeom>
+          <a:noFill/>
+          <a:extLst>
+            <a:ext uri="{909E8E84-426E-40DD-AFC4-6F175D3DCCD1}">
+              <a14:hiddenFill xmlns:a14="http://schemas.microsoft.com/office/drawing/2010/main">
+                <a:solidFill>
+                  <a:srgbClr val="FFFFFF"/>
+                </a:solidFill>
+              </a14:hiddenFill>
+            </a:ext>
+          </a:extLst>
+        </p:spPr>
+      </p:pic>
+    </p:spTree>
+    <p:extLst>
+      <p:ext uri="{BB962C8B-B14F-4D97-AF65-F5344CB8AC3E}">
+        <p14:creationId xmlns:p14="http://schemas.microsoft.com/office/powerpoint/2010/main" val="4208121231"/>
+      </p:ext>
+    </p:extLst>
+  </p:cSld>
+  <p:clrMapOvr>
+    <a:masterClrMapping/>
+  </p:clrMapOvr>
+</p:sld>
+</file>
+
 <file path=ppt/slides/slide2.xml><?xml version="1.0" encoding="utf-8"?>
 <p:sld xmlns:a="http://schemas.openxmlformats.org/drawingml/2006/main" xmlns:r="http://schemas.openxmlformats.org/officeDocument/2006/relationships" xmlns:p="http://schemas.openxmlformats.org/presentationml/2006/main">
   <p:cSld>
@@ -4138,7 +5510,7 @@
           <a:p>
             <a:r>
               <a:rPr lang="en-US"/>
-              <a:t>Problem?</a:t>
+              <a:t>Problem Definition</a:t>
             </a:r>
           </a:p>
         </p:txBody>
@@ -4161,16 +5533,129 @@
         </p:nvSpPr>
         <p:spPr/>
         <p:txBody>
-          <a:bodyPr/>
-          <a:lstStyle/>
-          <a:p>
-            <a:r>
-              <a:rPr lang="en-US"/>
-              <a:t>The problem being faced</a:t>
-            </a:r>
-          </a:p>
-        </p:txBody>
-      </p:sp>
+          <a:bodyPr vert="horz" lIns="91440" tIns="45720" rIns="91440" bIns="45720" rtlCol="0" anchor="t">
+            <a:normAutofit lnSpcReduction="10000"/>
+          </a:bodyPr>
+          <a:lstStyle/>
+          <a:p>
+            <a:pPr>
+              <a:buNone/>
+            </a:pPr>
+            <a:endParaRPr lang="en-US" sz="1800">
+              <a:latin typeface="Arial"/>
+              <a:cs typeface="Arial"/>
+            </a:endParaRPr>
+          </a:p>
+          <a:p>
+            <a:pPr>
+              <a:buNone/>
+            </a:pPr>
+            <a:r>
+              <a:rPr lang="en-US" sz="1900">
+                <a:latin typeface="Arial"/>
+                <a:cs typeface="Arial"/>
+              </a:rPr>
+              <a:t>In today’s digital landscape, users are overwhelmed by the vast number of movies available across streaming platforms and media libraries. Without personalized guidance, users often struggle to decide what to watch, leading to inefficient browsing and reduced overall satisfaction. Traditional recommendation methods, such as curated lists or genre-based sorting, fail to adapt to individual user preferences and do not learn unique viewing habits.</a:t>
+            </a:r>
+            <a:endParaRPr lang="en-US" sz="1900"/>
+          </a:p>
+          <a:p>
+            <a:pPr>
+              <a:buNone/>
+            </a:pPr>
+            <a:r>
+              <a:rPr lang="en-US" sz="1900">
+                <a:latin typeface="Arial"/>
+                <a:cs typeface="Arial"/>
+              </a:rPr>
+              <a:t>To address this challenge, we aim to develop </a:t>
+            </a:r>
+            <a:r>
+              <a:rPr lang="en-US" sz="1900" err="1">
+                <a:latin typeface="Arial"/>
+                <a:cs typeface="Arial"/>
+              </a:rPr>
+              <a:t>Moviemeter's</a:t>
+            </a:r>
+            <a:r>
+              <a:rPr lang="en-US" sz="1900">
+                <a:latin typeface="Arial"/>
+                <a:cs typeface="Arial"/>
+              </a:rPr>
+              <a:t> movie recommendation system capable of generating tailored movie suggestions based on user movie ratings. </a:t>
+            </a:r>
+          </a:p>
+          <a:p>
+            <a:pPr>
+              <a:buNone/>
+            </a:pPr>
+            <a:r>
+              <a:rPr lang="en-US" sz="1900">
+                <a:latin typeface="Arial"/>
+                <a:cs typeface="Arial"/>
+              </a:rPr>
+              <a:t>This project seeks to solve the problem of content overload by delivering accurate, personalized movie recommendations that improve user experience, reduce browsing time, and enhance overall satisfaction. The solution must be efficient, scalable, and capable of adapting to diverse user tastes.</a:t>
+            </a:r>
+            <a:endParaRPr lang="en-US" sz="1900"/>
+          </a:p>
+          <a:p>
+            <a:pPr marL="0" indent="0">
+              <a:buNone/>
+            </a:pPr>
+            <a:br>
+              <a:rPr lang="en-US"/>
+            </a:br>
+            <a:endParaRPr lang="en-US"/>
+          </a:p>
+        </p:txBody>
+      </p:sp>
+      <p:pic>
+        <p:nvPicPr>
+          <p:cNvPr id="1026" name="Picture 2" descr="Too Many Movies, Too Little Time |">
+            <a:extLst>
+              <a:ext uri="{FF2B5EF4-FFF2-40B4-BE49-F238E27FC236}">
+                <a16:creationId xmlns:a16="http://schemas.microsoft.com/office/drawing/2014/main" id="{0EFD3F6E-9684-9D11-8B7A-D2E090AF12C0}"/>
+              </a:ext>
+            </a:extLst>
+          </p:cNvPr>
+          <p:cNvPicPr>
+            <a:picLocks noChangeAspect="1" noChangeArrowheads="1"/>
+          </p:cNvPicPr>
+          <p:nvPr/>
+        </p:nvPicPr>
+        <p:blipFill>
+          <a:blip r:embed="rId3">
+            <a:extLst>
+              <a:ext uri="{28A0092B-C50C-407E-A947-70E740481C1C}">
+                <a14:useLocalDpi xmlns:a14="http://schemas.microsoft.com/office/drawing/2010/main" val="0"/>
+              </a:ext>
+            </a:extLst>
+          </a:blip>
+          <a:srcRect/>
+          <a:stretch>
+            <a:fillRect/>
+          </a:stretch>
+        </p:blipFill>
+        <p:spPr bwMode="auto">
+          <a:xfrm>
+            <a:off x="679450" y="1606550"/>
+            <a:ext cx="10847070" cy="3615690"/>
+          </a:xfrm>
+          <a:prstGeom prst="rect">
+            <a:avLst/>
+          </a:prstGeom>
+          <a:noFill/>
+          <a:extLst>
+            <a:ext uri="{909E8E84-426E-40DD-AFC4-6F175D3DCCD1}">
+              <a14:hiddenFill xmlns:a14="http://schemas.microsoft.com/office/drawing/2010/main">
+                <a:solidFill>
+                  <a:srgbClr val="FFFFFF"/>
+                </a:solidFill>
+              </a14:hiddenFill>
+            </a:ext>
+          </a:extLst>
+        </p:spPr>
+      </p:pic>
     </p:spTree>
     <p:extLst>
       <p:ext uri="{BB962C8B-B14F-4D97-AF65-F5344CB8AC3E}">
@@ -4187,6 +5672,14 @@
 <file path=ppt/slides/slide5.xml><?xml version="1.0" encoding="utf-8"?>
 <p:sld xmlns:a="http://schemas.openxmlformats.org/drawingml/2006/main" xmlns:r="http://schemas.openxmlformats.org/officeDocument/2006/relationships" xmlns:p="http://schemas.openxmlformats.org/presentationml/2006/main">
   <p:cSld>
+    <p:bg>
+      <p:bgPr>
+        <a:solidFill>
+          <a:srgbClr val="ED7D31"/>
+        </a:solidFill>
+        <a:effectLst/>
+      </p:bgPr>
+    </p:bg>
     <p:spTree>
       <p:nvGrpSpPr>
         <p:cNvPr id="1" name=""/>
@@ -4201,12 +5694,206 @@
           <a:chExt cx="0" cy="0"/>
         </a:xfrm>
       </p:grpSpPr>
+      <p:sp useBgFill="1">
+        <p:nvSpPr>
+          <p:cNvPr id="9" name="Rectangle 8">
+            <a:extLst>
+              <a:ext uri="{FF2B5EF4-FFF2-40B4-BE49-F238E27FC236}">
+                <a16:creationId xmlns:a16="http://schemas.microsoft.com/office/drawing/2014/main" id="{C1DD1A8A-57D5-4A81-AD04-532B043C5611}"/>
+              </a:ext>
+              <a:ext uri="{C183D7F6-B498-43B3-948B-1728B52AA6E4}">
+                <adec:decorative xmlns:adec="http://schemas.microsoft.com/office/drawing/2017/decorative" val="1"/>
+              </a:ext>
+            </a:extLst>
+          </p:cNvPr>
+          <p:cNvSpPr>
+            <a:spLocks noGrp="1" noRot="1" noChangeAspect="1" noMove="1" noResize="1" noEditPoints="1" noAdjustHandles="1" noChangeArrowheads="1" noChangeShapeType="1" noTextEdit="1"/>
+          </p:cNvSpPr>
+          <p:nvPr>
+            <p:extLst>
+              <p:ext uri="{386F3935-93C4-4BCD-93E2-E3B085C9AB24}">
+                <p16:designElem xmlns:p16="http://schemas.microsoft.com/office/powerpoint/2015/main" val="1"/>
+              </p:ext>
+            </p:extLst>
+          </p:nvPr>
+        </p:nvSpPr>
+        <p:spPr>
+          <a:xfrm>
+            <a:off x="-1" y="0"/>
+            <a:ext cx="12188952" cy="6858000"/>
+          </a:xfrm>
+          <a:prstGeom prst="rect">
+            <a:avLst/>
+          </a:prstGeom>
+          <a:ln>
+            <a:noFill/>
+          </a:ln>
+        </p:spPr>
+        <p:style>
+          <a:lnRef idx="2">
+            <a:schemeClr val="accent1">
+              <a:shade val="50000"/>
+            </a:schemeClr>
+          </a:lnRef>
+          <a:fillRef idx="1">
+            <a:schemeClr val="accent1"/>
+          </a:fillRef>
+          <a:effectRef idx="0">
+            <a:schemeClr val="accent1"/>
+          </a:effectRef>
+          <a:fontRef idx="minor">
+            <a:schemeClr val="lt1"/>
+          </a:fontRef>
+        </p:style>
+        <p:txBody>
+          <a:bodyPr rtlCol="0" anchor="ctr"/>
+          <a:lstStyle/>
+          <a:p>
+            <a:pPr algn="ctr"/>
+            <a:endParaRPr lang="en-US"/>
+          </a:p>
+        </p:txBody>
+      </p:sp>
+      <p:pic>
+        <p:nvPicPr>
+          <p:cNvPr id="5" name="Picture 4" descr="Yellow question mark">
+            <a:extLst>
+              <a:ext uri="{FF2B5EF4-FFF2-40B4-BE49-F238E27FC236}">
+                <a16:creationId xmlns:a16="http://schemas.microsoft.com/office/drawing/2014/main" id="{B3C86C18-6E9F-0DF9-1B66-1E117AA7D9B4}"/>
+              </a:ext>
+            </a:extLst>
+          </p:cNvPr>
+          <p:cNvPicPr>
+            <a:picLocks noChangeAspect="1"/>
+          </p:cNvPicPr>
+          <p:nvPr/>
+        </p:nvPicPr>
+        <p:blipFill>
+          <a:blip r:embed="rId3">
+            <a:extLst>
+              <a:ext uri="{BEBA8EAE-BF5A-486C-A8C5-ECC9F3942E4B}">
+                <a14:imgProps xmlns:a14="http://schemas.microsoft.com/office/drawing/2010/main">
+                  <a14:imgLayer r:embed="rId4">
+                    <a14:imgEffect>
+                      <a14:brightnessContrast contrast="-27000"/>
+                    </a14:imgEffect>
+                  </a14:imgLayer>
+                </a14:imgProps>
+              </a:ext>
+            </a:extLst>
+          </a:blip>
+          <a:srcRect l="211" t="-352" r="-254" b="6549"/>
+          <a:stretch>
+            <a:fillRect/>
+          </a:stretch>
+        </p:blipFill>
+        <p:spPr>
+          <a:xfrm>
+            <a:off x="2101" y="9"/>
+            <a:ext cx="12197156" cy="6861866"/>
+          </a:xfrm>
+          <a:prstGeom prst="rect">
+            <a:avLst/>
+          </a:prstGeom>
+        </p:spPr>
+      </p:pic>
+      <p:sp>
+        <p:nvSpPr>
+          <p:cNvPr id="11" name="Rectangle 10">
+            <a:extLst>
+              <a:ext uri="{FF2B5EF4-FFF2-40B4-BE49-F238E27FC236}">
+                <a16:creationId xmlns:a16="http://schemas.microsoft.com/office/drawing/2014/main" id="{007891EC-4501-44ED-A8C8-B11B6DB767AB}"/>
+              </a:ext>
+              <a:ext uri="{C183D7F6-B498-43B3-948B-1728B52AA6E4}">
+                <adec:decorative xmlns:adec="http://schemas.microsoft.com/office/drawing/2017/decorative" val="1"/>
+              </a:ext>
+            </a:extLst>
+          </p:cNvPr>
+          <p:cNvSpPr>
+            <a:spLocks noGrp="1" noRot="1" noChangeAspect="1" noMove="1" noResize="1" noEditPoints="1" noAdjustHandles="1" noChangeArrowheads="1" noChangeShapeType="1" noTextEdit="1"/>
+          </p:cNvSpPr>
+          <p:nvPr>
+            <p:extLst>
+              <p:ext uri="{386F3935-93C4-4BCD-93E2-E3B085C9AB24}">
+                <p16:designElem xmlns:p16="http://schemas.microsoft.com/office/powerpoint/2015/main" val="1"/>
+              </p:ext>
+            </p:extLst>
+          </p:nvPr>
+        </p:nvSpPr>
+        <p:spPr>
+          <a:xfrm>
+            <a:off x="0" y="2207602"/>
+            <a:ext cx="12191999" cy="3162146"/>
+          </a:xfrm>
+          <a:prstGeom prst="rect">
+            <a:avLst/>
+          </a:prstGeom>
+          <a:gradFill flip="none" rotWithShape="1">
+            <a:gsLst>
+              <a:gs pos="0">
+                <a:srgbClr val="000000">
+                  <a:alpha val="0"/>
+                </a:srgbClr>
+              </a:gs>
+              <a:gs pos="25000">
+                <a:srgbClr val="000000">
+                  <a:alpha val="15000"/>
+                </a:srgbClr>
+              </a:gs>
+              <a:gs pos="75000">
+                <a:srgbClr val="000000">
+                  <a:alpha val="15000"/>
+                </a:srgbClr>
+              </a:gs>
+              <a:gs pos="50000">
+                <a:srgbClr val="000000">
+                  <a:alpha val="30000"/>
+                </a:srgbClr>
+              </a:gs>
+              <a:gs pos="100000">
+                <a:srgbClr val="000000">
+                  <a:alpha val="0"/>
+                </a:srgbClr>
+              </a:gs>
+            </a:gsLst>
+            <a:lin ang="16200000" scaled="1"/>
+            <a:tileRect/>
+          </a:gradFill>
+          <a:ln>
+            <a:noFill/>
+          </a:ln>
+        </p:spPr>
+        <p:style>
+          <a:lnRef idx="2">
+            <a:schemeClr val="accent1">
+              <a:shade val="50000"/>
+            </a:schemeClr>
+          </a:lnRef>
+          <a:fillRef idx="1">
+            <a:schemeClr val="accent1"/>
+          </a:fillRef>
+          <a:effectRef idx="0">
+            <a:schemeClr val="accent1"/>
+          </a:effectRef>
+          <a:fontRef idx="minor">
+            <a:schemeClr val="lt1"/>
+          </a:fontRef>
+        </p:style>
+        <p:txBody>
+          <a:bodyPr rtlCol="0" anchor="ctr"/>
+          <a:lstStyle/>
+          <a:p>
+            <a:pPr algn="ctr"/>
+            <a:endParaRPr lang="en-US"/>
+          </a:p>
+        </p:txBody>
+      </p:sp>
       <p:sp>
         <p:nvSpPr>
           <p:cNvPr id="2" name="Title 1">
             <a:extLst>
               <a:ext uri="{FF2B5EF4-FFF2-40B4-BE49-F238E27FC236}">
-                <a16:creationId xmlns:a16="http://schemas.microsoft.com/office/drawing/2014/main" id="{EC12F9FC-7347-C4AA-FEA6-BE6A17550878}"/>
+                <a16:creationId xmlns:a16="http://schemas.microsoft.com/office/drawing/2014/main" id="{EEA7B1C0-ACBE-5B85-AD51-1025E455B671}"/>
               </a:ext>
             </a:extLst>
           </p:cNvPr>
@@ -4217,47 +5904,41 @@
             <p:ph type="title"/>
           </p:nvPr>
         </p:nvSpPr>
-        <p:spPr/>
-        <p:txBody>
-          <a:bodyPr/>
-          <a:lstStyle/>
-          <a:p>
-            <a:r>
-              <a:rPr lang="en-US"/>
-              <a:t>AI Methods and Methodology</a:t>
-            </a:r>
-          </a:p>
-        </p:txBody>
-      </p:sp>
-      <p:sp>
-        <p:nvSpPr>
-          <p:cNvPr id="3" name="Content Placeholder 2">
-            <a:extLst>
-              <a:ext uri="{FF2B5EF4-FFF2-40B4-BE49-F238E27FC236}">
-                <a16:creationId xmlns:a16="http://schemas.microsoft.com/office/drawing/2014/main" id="{8C2ADA0D-3EF2-7A88-6311-1F3D1564B422}"/>
-              </a:ext>
-            </a:extLst>
-          </p:cNvPr>
-          <p:cNvSpPr>
-            <a:spLocks noGrp="1"/>
-          </p:cNvSpPr>
-          <p:nvPr>
-            <p:ph idx="1"/>
-          </p:nvPr>
-        </p:nvSpPr>
-        <p:spPr/>
-        <p:txBody>
-          <a:bodyPr/>
-          <a:lstStyle/>
-          <a:p>
-            <a:endParaRPr lang="en-US"/>
+        <p:spPr>
+          <a:xfrm>
+            <a:off x="-2103120" y="-2470977"/>
+            <a:ext cx="10058400" cy="3574778"/>
+          </a:xfrm>
+          <a:effectLst>
+            <a:outerShdw blurRad="50800" dist="38100" dir="2700000" algn="tl" rotWithShape="0">
+              <a:prstClr val="black">
+                <a:alpha val="40000"/>
+              </a:prstClr>
+            </a:outerShdw>
+          </a:effectLst>
+        </p:spPr>
+        <p:txBody>
+          <a:bodyPr vert="horz" lIns="91440" tIns="45720" rIns="91440" bIns="45720" rtlCol="0" anchor="b">
+            <a:normAutofit/>
+          </a:bodyPr>
+          <a:lstStyle/>
+          <a:p>
+            <a:pPr algn="ctr"/>
+            <a:r>
+              <a:rPr lang="en-US" sz="5200">
+                <a:solidFill>
+                  <a:srgbClr val="FFFFFF"/>
+                </a:solidFill>
+              </a:rPr>
+              <a:t>Possible Solution?</a:t>
+            </a:r>
           </a:p>
         </p:txBody>
       </p:sp>
     </p:spTree>
     <p:extLst>
       <p:ext uri="{BB962C8B-B14F-4D97-AF65-F5344CB8AC3E}">
-        <p14:creationId xmlns:p14="http://schemas.microsoft.com/office/powerpoint/2010/main" val="581820033"/>
+        <p14:creationId xmlns:p14="http://schemas.microsoft.com/office/powerpoint/2010/main" val="2387232387"/>
       </p:ext>
     </p:extLst>
   </p:cSld>
@@ -4289,7 +5970,7 @@
           <p:cNvPr id="2" name="Title 1">
             <a:extLst>
               <a:ext uri="{FF2B5EF4-FFF2-40B4-BE49-F238E27FC236}">
-                <a16:creationId xmlns:a16="http://schemas.microsoft.com/office/drawing/2014/main" id="{A343D473-C842-16A8-4945-58EF8098603D}"/>
+                <a16:creationId xmlns:a16="http://schemas.microsoft.com/office/drawing/2014/main" id="{EC12F9FC-7347-C4AA-FEA6-BE6A17550878}"/>
               </a:ext>
             </a:extLst>
           </p:cNvPr>
@@ -4307,7 +5988,7 @@
           <a:p>
             <a:r>
               <a:rPr lang="en-US"/>
-              <a:t>Results and Analysis </a:t>
+              <a:t>AI Methods and Methodology</a:t>
             </a:r>
           </a:p>
         </p:txBody>
@@ -4317,7 +5998,7 @@
           <p:cNvPr id="3" name="Content Placeholder 2">
             <a:extLst>
               <a:ext uri="{FF2B5EF4-FFF2-40B4-BE49-F238E27FC236}">
-                <a16:creationId xmlns:a16="http://schemas.microsoft.com/office/drawing/2014/main" id="{01D99C7A-B5F3-BF16-461E-0A715D3C58FF}"/>
+                <a16:creationId xmlns:a16="http://schemas.microsoft.com/office/drawing/2014/main" id="{8C2ADA0D-3EF2-7A88-6311-1F3D1564B422}"/>
               </a:ext>
             </a:extLst>
           </p:cNvPr>
@@ -4328,10 +6009,65 @@
             <p:ph idx="1"/>
           </p:nvPr>
         </p:nvSpPr>
-        <p:spPr/>
-        <p:txBody>
-          <a:bodyPr/>
-          <a:lstStyle/>
+        <p:spPr>
+          <a:xfrm>
+            <a:off x="838200" y="1801812"/>
+            <a:ext cx="10515600" cy="4351338"/>
+          </a:xfrm>
+        </p:spPr>
+        <p:txBody>
+          <a:bodyPr vert="horz" lIns="91440" tIns="45720" rIns="91440" bIns="45720" rtlCol="0" anchor="t">
+            <a:normAutofit/>
+          </a:bodyPr>
+          <a:lstStyle/>
+          <a:p>
+            <a:r>
+              <a:rPr lang="en-US" b="1"/>
+              <a:t>Scalable storage:</a:t>
+            </a:r>
+            <a:r>
+              <a:rPr lang="en-US"/>
+              <a:t> </a:t>
+            </a:r>
+            <a:r>
+              <a:rPr lang="en-US" err="1"/>
+              <a:t>Supabase</a:t>
+            </a:r>
+            <a:r>
+              <a:rPr lang="en-US"/>
+              <a:t> enables reliable retrieval and deployment of recommendation data.</a:t>
+            </a:r>
+          </a:p>
+          <a:p>
+            <a:r>
+              <a:rPr lang="en-US" b="1"/>
+              <a:t>Collaborative filtering (SVD)</a:t>
+            </a:r>
+            <a:r>
+              <a:rPr lang="en-US"/>
+              <a:t> effectively extracts underlying user–movie preference patterns.</a:t>
+            </a:r>
+          </a:p>
+          <a:p>
+            <a:r>
+              <a:rPr lang="en-US" b="1"/>
+              <a:t>Automated training and batch insertion</a:t>
+            </a:r>
+            <a:r>
+              <a:rPr lang="en-US"/>
+              <a:t> support periodic refresh cycles for evolving user interactions.</a:t>
+            </a:r>
+          </a:p>
+          <a:p>
+            <a:r>
+              <a:rPr lang="en-US" b="1"/>
+              <a:t>Efficient preprocessing and batching</a:t>
+            </a:r>
+            <a:r>
+              <a:rPr lang="en-US"/>
+              <a:t> ensure low computational overhead and maintainability.</a:t>
+            </a:r>
+          </a:p>
           <a:p>
             <a:endParaRPr lang="en-US"/>
           </a:p>
@@ -4340,7 +6076,7 @@
     </p:spTree>
     <p:extLst>
       <p:ext uri="{BB962C8B-B14F-4D97-AF65-F5344CB8AC3E}">
-        <p14:creationId xmlns:p14="http://schemas.microsoft.com/office/powerpoint/2010/main" val="4041947008"/>
+        <p14:creationId xmlns:p14="http://schemas.microsoft.com/office/powerpoint/2010/main" val="581820033"/>
       </p:ext>
     </p:extLst>
   </p:cSld>
@@ -4372,7 +6108,7 @@
           <p:cNvPr id="2" name="Title 1">
             <a:extLst>
               <a:ext uri="{FF2B5EF4-FFF2-40B4-BE49-F238E27FC236}">
-                <a16:creationId xmlns:a16="http://schemas.microsoft.com/office/drawing/2014/main" id="{9A17184B-4937-E195-E578-C625B2AB911F}"/>
+                <a16:creationId xmlns:a16="http://schemas.microsoft.com/office/drawing/2014/main" id="{D3F38EFC-D39D-9AD2-7227-26B31AA23308}"/>
               </a:ext>
             </a:extLst>
           </p:cNvPr>
@@ -4390,7 +6126,7 @@
           <a:p>
             <a:r>
               <a:rPr lang="en-US"/>
-              <a:t>Demo Time</a:t>
+              <a:t>How It Works?</a:t>
             </a:r>
           </a:p>
         </p:txBody>
@@ -4400,7 +6136,7 @@
           <p:cNvPr id="3" name="Content Placeholder 2">
             <a:extLst>
               <a:ext uri="{FF2B5EF4-FFF2-40B4-BE49-F238E27FC236}">
-                <a16:creationId xmlns:a16="http://schemas.microsoft.com/office/drawing/2014/main" id="{1B191FC7-E9E7-3739-A6B0-ADEEF9FD8DFB}"/>
+                <a16:creationId xmlns:a16="http://schemas.microsoft.com/office/drawing/2014/main" id="{C1A7868B-4A67-5DE6-A078-C407C7B20D39}"/>
               </a:ext>
             </a:extLst>
           </p:cNvPr>
@@ -4413,17 +6149,102 @@
         </p:nvSpPr>
         <p:spPr/>
         <p:txBody>
-          <a:bodyPr/>
-          <a:lstStyle/>
-          <a:p>
+          <a:bodyPr>
+            <a:normAutofit fontScale="92500" lnSpcReduction="10000"/>
+          </a:bodyPr>
+          <a:lstStyle/>
+          <a:p>
+            <a:pPr marL="0" indent="0">
+              <a:buNone/>
+            </a:pPr>
+            <a:r>
+              <a:rPr lang="en-US"/>
+              <a:t>1. Loads environment and connects to </a:t>
+            </a:r>
+            <a:r>
+              <a:rPr lang="en-US" err="1"/>
+              <a:t>Supabase</a:t>
+            </a:r>
             <a:endParaRPr lang="en-US"/>
+          </a:p>
+          <a:p>
+            <a:pPr marL="0" indent="0">
+              <a:buNone/>
+            </a:pPr>
+            <a:r>
+              <a:rPr lang="en-US"/>
+              <a:t>2. Fetch users’ liked movies from DB</a:t>
+            </a:r>
+          </a:p>
+          <a:p>
+            <a:pPr marL="0" indent="0">
+              <a:buNone/>
+            </a:pPr>
+            <a:r>
+              <a:rPr lang="en-US"/>
+              <a:t>3. Converts user ID and movie ID into strings (input for SVD)</a:t>
+            </a:r>
+          </a:p>
+          <a:p>
+            <a:pPr marL="0" indent="0">
+              <a:buNone/>
+            </a:pPr>
+            <a:r>
+              <a:rPr lang="en-US"/>
+              <a:t>4. Creates rating scale (1-5), loads data into Surprise, and builds complete training set using all data</a:t>
+            </a:r>
+          </a:p>
+          <a:p>
+            <a:pPr marL="0" indent="0">
+              <a:buNone/>
+            </a:pPr>
+            <a:r>
+              <a:rPr lang="en-US"/>
+              <a:t>5. Train on SVD model </a:t>
+            </a:r>
+          </a:p>
+          <a:p>
+            <a:pPr marL="0" indent="0">
+              <a:buNone/>
+            </a:pPr>
+            <a:r>
+              <a:rPr lang="en-US"/>
+              <a:t>6. Generate predictions for each user </a:t>
+            </a:r>
+          </a:p>
+          <a:p>
+            <a:pPr marL="0" indent="0">
+              <a:buNone/>
+            </a:pPr>
+            <a:r>
+              <a:rPr lang="en-US"/>
+              <a:t>7. Delete Old recommendations in DB</a:t>
+            </a:r>
+          </a:p>
+          <a:p>
+            <a:pPr marL="0" indent="0">
+              <a:buNone/>
+            </a:pPr>
+            <a:r>
+              <a:rPr lang="en-US"/>
+              <a:t>8. Insert New Recommendations in DB</a:t>
+            </a:r>
+          </a:p>
+          <a:p>
+            <a:pPr marL="0" indent="0">
+              <a:buNone/>
+            </a:pPr>
+            <a:r>
+              <a:rPr lang="en-US"/>
+              <a:t>9. Display Recommendations</a:t>
+            </a:r>
           </a:p>
         </p:txBody>
       </p:sp>
     </p:spTree>
     <p:extLst>
       <p:ext uri="{BB962C8B-B14F-4D97-AF65-F5344CB8AC3E}">
-        <p14:creationId xmlns:p14="http://schemas.microsoft.com/office/powerpoint/2010/main" val="2022626399"/>
+        <p14:creationId xmlns:p14="http://schemas.microsoft.com/office/powerpoint/2010/main" val="844050267"/>
       </p:ext>
     </p:extLst>
   </p:cSld>
@@ -4455,7 +6276,7 @@
           <p:cNvPr id="2" name="Title 1">
             <a:extLst>
               <a:ext uri="{FF2B5EF4-FFF2-40B4-BE49-F238E27FC236}">
-                <a16:creationId xmlns:a16="http://schemas.microsoft.com/office/drawing/2014/main" id="{B678E253-B61B-D448-65D1-6310696939B1}"/>
+                <a16:creationId xmlns:a16="http://schemas.microsoft.com/office/drawing/2014/main" id="{A343D473-C842-16A8-4945-58EF8098603D}"/>
               </a:ext>
             </a:extLst>
           </p:cNvPr>
@@ -4473,40 +6294,310 @@
           <a:p>
             <a:r>
               <a:rPr lang="en-US"/>
-              <a:t>Thank you for listening</a:t>
-            </a:r>
-          </a:p>
-        </p:txBody>
-      </p:sp>
-      <p:sp>
-        <p:nvSpPr>
-          <p:cNvPr id="3" name="Content Placeholder 2">
-            <a:extLst>
-              <a:ext uri="{FF2B5EF4-FFF2-40B4-BE49-F238E27FC236}">
-                <a16:creationId xmlns:a16="http://schemas.microsoft.com/office/drawing/2014/main" id="{78A205BC-D0D5-B0D3-6029-D27969668505}"/>
-              </a:ext>
-            </a:extLst>
-          </p:cNvPr>
-          <p:cNvSpPr>
-            <a:spLocks noGrp="1"/>
+              <a:t>Results and Analysis </a:t>
+            </a:r>
+          </a:p>
+        </p:txBody>
+      </p:sp>
+      <p:sp>
+        <p:nvSpPr>
+          <p:cNvPr id="4" name="Rectangle 1">
+            <a:extLst>
+              <a:ext uri="{FF2B5EF4-FFF2-40B4-BE49-F238E27FC236}">
+                <a16:creationId xmlns:a16="http://schemas.microsoft.com/office/drawing/2014/main" id="{9F5191A0-07CA-8920-D644-575723A6AAAE}"/>
+              </a:ext>
+            </a:extLst>
+          </p:cNvPr>
+          <p:cNvSpPr>
+            <a:spLocks noGrp="1" noChangeArrowheads="1"/>
           </p:cNvSpPr>
           <p:nvPr>
             <p:ph idx="1"/>
           </p:nvPr>
         </p:nvSpPr>
-        <p:spPr/>
-        <p:txBody>
-          <a:bodyPr/>
-          <a:lstStyle/>
-          <a:p>
-            <a:endParaRPr lang="en-US"/>
+        <p:spPr bwMode="auto">
+          <a:xfrm>
+            <a:off x="161925" y="1562215"/>
+            <a:ext cx="10834687" cy="3170099"/>
+          </a:xfrm>
+          <a:prstGeom prst="rect">
+            <a:avLst/>
+          </a:prstGeom>
+          <a:noFill/>
+          <a:ln>
+            <a:noFill/>
+          </a:ln>
+          <a:effectLst/>
+          <a:extLst>
+            <a:ext uri="{909E8E84-426E-40DD-AFC4-6F175D3DCCD1}">
+              <a14:hiddenFill xmlns:a14="http://schemas.microsoft.com/office/drawing/2010/main">
+                <a:solidFill>
+                  <a:schemeClr val="accent1"/>
+                </a:solidFill>
+              </a14:hiddenFill>
+            </a:ext>
+            <a:ext uri="{91240B29-F687-4F45-9708-019B960494DF}">
+              <a14:hiddenLine xmlns:a14="http://schemas.microsoft.com/office/drawing/2010/main" w="9525">
+                <a:solidFill>
+                  <a:schemeClr val="tx1"/>
+                </a:solidFill>
+                <a:miter lim="800000"/>
+                <a:headEnd/>
+                <a:tailEnd/>
+              </a14:hiddenLine>
+            </a:ext>
+            <a:ext uri="{AF507438-7753-43E0-B8FC-AC1667EBCBE1}">
+              <a14:hiddenEffects xmlns:a14="http://schemas.microsoft.com/office/drawing/2010/main">
+                <a:effectLst>
+                  <a:outerShdw dist="35921" dir="2700000" algn="ctr" rotWithShape="0">
+                    <a:schemeClr val="bg2"/>
+                  </a:outerShdw>
+                </a:effectLst>
+              </a14:hiddenEffects>
+            </a:ext>
+          </a:extLst>
+        </p:spPr>
+        <p:txBody>
+          <a:bodyPr vert="horz" wrap="square" lIns="91440" tIns="45720" rIns="91440" bIns="45720" numCol="1" anchor="ctr" anchorCtr="0" compatLnSpc="1">
+            <a:prstTxWarp prst="textNoShape">
+              <a:avLst/>
+            </a:prstTxWarp>
+            <a:spAutoFit/>
+          </a:bodyPr>
+          <a:lstStyle/>
+          <a:p>
+            <a:pPr eaLnBrk="0" fontAlgn="base" hangingPunct="0">
+              <a:lnSpc>
+                <a:spcPct val="100000"/>
+              </a:lnSpc>
+              <a:spcBef>
+                <a:spcPct val="0"/>
+              </a:spcBef>
+              <a:spcAft>
+                <a:spcPct val="0"/>
+              </a:spcAft>
+            </a:pPr>
+            <a:r>
+              <a:rPr kumimoji="0" lang="en-US" altLang="en-US" sz="2000" b="0" i="0" u="none" strike="noStrike" cap="none" normalizeH="0" baseline="0">
+                <a:ln>
+                  <a:noFill/>
+                </a:ln>
+                <a:solidFill>
+                  <a:schemeClr val="tx1"/>
+                </a:solidFill>
+                <a:effectLst/>
+                <a:latin typeface="Arial" panose="020B0604020202020204" pitchFamily="34" charset="0"/>
+              </a:rPr>
+              <a:t>The full AI pipeline runs successfully: data retrieval, model training, prediction generation and database upload.</a:t>
+            </a:r>
+          </a:p>
+          <a:p>
+            <a:pPr eaLnBrk="0" fontAlgn="base" hangingPunct="0">
+              <a:lnSpc>
+                <a:spcPct val="100000"/>
+              </a:lnSpc>
+              <a:spcBef>
+                <a:spcPct val="0"/>
+              </a:spcBef>
+              <a:spcAft>
+                <a:spcPct val="0"/>
+              </a:spcAft>
+            </a:pPr>
+            <a:r>
+              <a:rPr kumimoji="0" lang="en-US" altLang="en-US" sz="2000" b="0" i="0" u="none" strike="noStrike" cap="none" normalizeH="0" baseline="0">
+                <a:ln>
+                  <a:noFill/>
+                </a:ln>
+                <a:solidFill>
+                  <a:schemeClr val="tx1"/>
+                </a:solidFill>
+                <a:effectLst/>
+                <a:latin typeface="Arial" panose="020B0604020202020204" pitchFamily="34" charset="0"/>
+              </a:rPr>
+              <a:t>SVD model produces accurate, personalized recommendations based on user rating history.</a:t>
+            </a:r>
+          </a:p>
+          <a:p>
+            <a:pPr eaLnBrk="0" fontAlgn="base" hangingPunct="0">
+              <a:lnSpc>
+                <a:spcPct val="100000"/>
+              </a:lnSpc>
+              <a:spcBef>
+                <a:spcPct val="0"/>
+              </a:spcBef>
+              <a:spcAft>
+                <a:spcPct val="0"/>
+              </a:spcAft>
+            </a:pPr>
+            <a:r>
+              <a:rPr kumimoji="0" lang="en-US" altLang="en-US" sz="2000" b="0" i="0" u="none" strike="noStrike" cap="none" normalizeH="0" baseline="0">
+                <a:ln>
+                  <a:noFill/>
+                </a:ln>
+                <a:solidFill>
+                  <a:schemeClr val="tx1"/>
+                </a:solidFill>
+                <a:effectLst/>
+                <a:latin typeface="Arial" panose="020B0604020202020204" pitchFamily="34" charset="0"/>
+              </a:rPr>
+              <a:t>Recommendations exclude previously liked movies and align well with user genre/taste patterns.</a:t>
+            </a:r>
+          </a:p>
+          <a:p>
+            <a:pPr eaLnBrk="0" fontAlgn="base" hangingPunct="0">
+              <a:lnSpc>
+                <a:spcPct val="100000"/>
+              </a:lnSpc>
+              <a:spcBef>
+                <a:spcPct val="0"/>
+              </a:spcBef>
+              <a:spcAft>
+                <a:spcPct val="0"/>
+              </a:spcAft>
+            </a:pPr>
+            <a:r>
+              <a:rPr kumimoji="0" lang="en-US" altLang="en-US" sz="2000" b="0" i="0" u="none" strike="noStrike" cap="none" normalizeH="0" baseline="0">
+                <a:ln>
+                  <a:noFill/>
+                </a:ln>
+                <a:solidFill>
+                  <a:schemeClr val="tx1"/>
+                </a:solidFill>
+                <a:effectLst/>
+                <a:latin typeface="Arial" panose="020B0604020202020204" pitchFamily="34" charset="0"/>
+              </a:rPr>
+              <a:t>Backend is stable: </a:t>
+            </a:r>
+            <a:r>
+              <a:rPr kumimoji="0" lang="en-US" altLang="en-US" sz="2000" b="0" i="0" u="none" strike="noStrike" cap="none" normalizeH="0" baseline="0" err="1">
+                <a:ln>
+                  <a:noFill/>
+                </a:ln>
+                <a:solidFill>
+                  <a:schemeClr val="tx1"/>
+                </a:solidFill>
+                <a:effectLst/>
+                <a:latin typeface="Arial" panose="020B0604020202020204" pitchFamily="34" charset="0"/>
+              </a:rPr>
+              <a:t>Supabase</a:t>
+            </a:r>
+            <a:r>
+              <a:rPr kumimoji="0" lang="en-US" altLang="en-US" sz="2000" b="0" i="0" u="none" strike="noStrike" cap="none" normalizeH="0" baseline="0">
+                <a:ln>
+                  <a:noFill/>
+                </a:ln>
+                <a:solidFill>
+                  <a:schemeClr val="tx1"/>
+                </a:solidFill>
+                <a:effectLst/>
+                <a:latin typeface="Arial" panose="020B0604020202020204" pitchFamily="34" charset="0"/>
+              </a:rPr>
+              <a:t> tables sync correctly, batch inserts work efficiently, and no runtime errors occur.</a:t>
+            </a:r>
+          </a:p>
+          <a:p>
+            <a:pPr eaLnBrk="0" fontAlgn="base" hangingPunct="0">
+              <a:lnSpc>
+                <a:spcPct val="100000"/>
+              </a:lnSpc>
+              <a:spcBef>
+                <a:spcPct val="0"/>
+              </a:spcBef>
+              <a:spcAft>
+                <a:spcPct val="0"/>
+              </a:spcAft>
+            </a:pPr>
+            <a:r>
+              <a:rPr kumimoji="0" lang="en-US" altLang="en-US" sz="2000" b="0" i="0" u="none" strike="noStrike" cap="none" normalizeH="0" baseline="0">
+                <a:ln>
+                  <a:noFill/>
+                </a:ln>
+                <a:solidFill>
+                  <a:schemeClr val="tx1"/>
+                </a:solidFill>
+                <a:effectLst/>
+                <a:latin typeface="Arial" panose="020B0604020202020204" pitchFamily="34" charset="0"/>
+              </a:rPr>
+              <a:t>User experience improves</a:t>
+            </a:r>
+            <a:r>
+              <a:rPr lang="en-US" altLang="en-US" sz="2000">
+                <a:latin typeface="Arial" panose="020B0604020202020204" pitchFamily="34" charset="0"/>
+              </a:rPr>
+              <a:t>. M</a:t>
+            </a:r>
+            <a:r>
+              <a:rPr kumimoji="0" lang="en-US" altLang="en-US" sz="2000" b="0" i="0" u="none" strike="noStrike" cap="none" normalizeH="0" baseline="0">
+                <a:ln>
+                  <a:noFill/>
+                </a:ln>
+                <a:solidFill>
+                  <a:schemeClr val="tx1"/>
+                </a:solidFill>
+                <a:effectLst/>
+                <a:latin typeface="Arial" panose="020B0604020202020204" pitchFamily="34" charset="0"/>
+              </a:rPr>
+              <a:t>ovies are easier to find, search time is reduced, and recommendations update instantly after new likes.</a:t>
+            </a:r>
+          </a:p>
+          <a:p>
+            <a:pPr eaLnBrk="0" fontAlgn="base" hangingPunct="0">
+              <a:lnSpc>
+                <a:spcPct val="100000"/>
+              </a:lnSpc>
+              <a:spcBef>
+                <a:spcPct val="0"/>
+              </a:spcBef>
+              <a:spcAft>
+                <a:spcPct val="0"/>
+              </a:spcAft>
+            </a:pPr>
+            <a:r>
+              <a:rPr kumimoji="0" lang="en-US" altLang="en-US" sz="2000" b="0" i="0" u="none" strike="noStrike" cap="none" normalizeH="0" baseline="0">
+                <a:ln>
+                  <a:noFill/>
+                </a:ln>
+                <a:solidFill>
+                  <a:schemeClr val="tx1"/>
+                </a:solidFill>
+                <a:effectLst/>
+                <a:latin typeface="Arial" panose="020B0604020202020204" pitchFamily="34" charset="0"/>
+              </a:rPr>
+              <a:t>Overall, </a:t>
+            </a:r>
+            <a:r>
+              <a:rPr kumimoji="0" lang="en-US" altLang="en-US" sz="2000" b="0" i="0" u="none" strike="noStrike" cap="none" normalizeH="0" baseline="0" err="1">
+                <a:ln>
+                  <a:noFill/>
+                </a:ln>
+                <a:solidFill>
+                  <a:schemeClr val="tx1"/>
+                </a:solidFill>
+                <a:effectLst/>
+                <a:latin typeface="Arial" panose="020B0604020202020204" pitchFamily="34" charset="0"/>
+              </a:rPr>
+              <a:t>MovieMeter</a:t>
+            </a:r>
+            <a:r>
+              <a:rPr kumimoji="0" lang="en-US" altLang="en-US" sz="2000" b="0" i="0" u="none" strike="noStrike" cap="none" normalizeH="0" baseline="0">
+                <a:ln>
+                  <a:noFill/>
+                </a:ln>
+                <a:solidFill>
+                  <a:schemeClr val="tx1"/>
+                </a:solidFill>
+                <a:effectLst/>
+                <a:latin typeface="Arial" panose="020B0604020202020204" pitchFamily="34" charset="0"/>
+              </a:rPr>
+              <a:t> is fully functional, reliable, and ready for real user usage and scaling.</a:t>
+            </a:r>
           </a:p>
         </p:txBody>
       </p:sp>
     </p:spTree>
     <p:extLst>
       <p:ext uri="{BB962C8B-B14F-4D97-AF65-F5344CB8AC3E}">
-        <p14:creationId xmlns:p14="http://schemas.microsoft.com/office/powerpoint/2010/main" val="3235235595"/>
+        <p14:creationId xmlns:p14="http://schemas.microsoft.com/office/powerpoint/2010/main" val="4041947008"/>
       </p:ext>
     </p:extLst>
   </p:cSld>
@@ -4538,7 +6629,7 @@
           <p:cNvPr id="2" name="Title 1">
             <a:extLst>
               <a:ext uri="{FF2B5EF4-FFF2-40B4-BE49-F238E27FC236}">
-                <a16:creationId xmlns:a16="http://schemas.microsoft.com/office/drawing/2014/main" id="{333DCC2F-63C6-155E-2F14-ECA88B217974}"/>
+                <a16:creationId xmlns:a16="http://schemas.microsoft.com/office/drawing/2014/main" id="{9A17184B-4937-E195-E578-C625B2AB911F}"/>
               </a:ext>
             </a:extLst>
           </p:cNvPr>
@@ -4556,7 +6647,7 @@
           <a:p>
             <a:r>
               <a:rPr lang="en-US"/>
-              <a:t>Questions?</a:t>
+              <a:t>Demo</a:t>
             </a:r>
           </a:p>
         </p:txBody>
@@ -4566,7 +6657,7 @@
           <p:cNvPr id="3" name="Content Placeholder 2">
             <a:extLst>
               <a:ext uri="{FF2B5EF4-FFF2-40B4-BE49-F238E27FC236}">
-                <a16:creationId xmlns:a16="http://schemas.microsoft.com/office/drawing/2014/main" id="{CA21D293-01F4-83D1-4E76-EF3B5C59F821}"/>
+                <a16:creationId xmlns:a16="http://schemas.microsoft.com/office/drawing/2014/main" id="{1B191FC7-E9E7-3739-A6B0-ADEEF9FD8DFB}"/>
               </a:ext>
             </a:extLst>
           </p:cNvPr>
@@ -4589,7 +6680,7 @@
     </p:spTree>
     <p:extLst>
       <p:ext uri="{BB962C8B-B14F-4D97-AF65-F5344CB8AC3E}">
-        <p14:creationId xmlns:p14="http://schemas.microsoft.com/office/powerpoint/2010/main" val="4208121231"/>
+        <p14:creationId xmlns:p14="http://schemas.microsoft.com/office/powerpoint/2010/main" val="2022626399"/>
       </p:ext>
     </p:extLst>
   </p:cSld>
@@ -4912,4 +7003,319 @@
     </a:ext>
   </a:extLst>
 </a:theme>
+</file>
+
+<file path=ppt/theme/theme2.xml><?xml version="1.0" encoding="utf-8"?>
+<a:theme xmlns:a="http://schemas.openxmlformats.org/drawingml/2006/main" name="Office Theme">
+  <a:themeElements>
+    <a:clrScheme name="Office">
+      <a:dk1>
+        <a:sysClr val="windowText" lastClr="000000"/>
+      </a:dk1>
+      <a:lt1>
+        <a:sysClr val="window" lastClr="FFFFFF"/>
+      </a:lt1>
+      <a:dk2>
+        <a:srgbClr val="0E2841"/>
+      </a:dk2>
+      <a:lt2>
+        <a:srgbClr val="E8E8E8"/>
+      </a:lt2>
+      <a:accent1>
+        <a:srgbClr val="156082"/>
+      </a:accent1>
+      <a:accent2>
+        <a:srgbClr val="E97132"/>
+      </a:accent2>
+      <a:accent3>
+        <a:srgbClr val="196B24"/>
+      </a:accent3>
+      <a:accent4>
+        <a:srgbClr val="0F9ED5"/>
+      </a:accent4>
+      <a:accent5>
+        <a:srgbClr val="A02B93"/>
+      </a:accent5>
+      <a:accent6>
+        <a:srgbClr val="4EA72E"/>
+      </a:accent6>
+      <a:hlink>
+        <a:srgbClr val="467886"/>
+      </a:hlink>
+      <a:folHlink>
+        <a:srgbClr val="96607D"/>
+      </a:folHlink>
+    </a:clrScheme>
+    <a:fontScheme name="Office">
+      <a:majorFont>
+        <a:latin typeface="Aptos Display" panose="02110004020202020204"/>
+        <a:ea typeface=""/>
+        <a:cs typeface=""/>
+        <a:font script="Jpan" typeface="游ゴシック Light"/>
+        <a:font script="Hang" typeface="맑은 고딕"/>
+        <a:font script="Hans" typeface="等线 Light"/>
+        <a:font script="Hant" typeface="新細明體"/>
+        <a:font script="Arab" typeface="Times New Roman"/>
+        <a:font script="Hebr" typeface="Times New Roman"/>
+        <a:font script="Thai" typeface="Angsana New"/>
+        <a:font script="Ethi" typeface="Nyala"/>
+        <a:font script="Beng" typeface="Vrinda"/>
+        <a:font script="Gujr" typeface="Shruti"/>
+        <a:font script="Khmr" typeface="MoolBoran"/>
+        <a:font script="Knda" typeface="Tunga"/>
+        <a:font script="Guru" typeface="Raavi"/>
+        <a:font script="Cans" typeface="Euphemia"/>
+        <a:font script="Cher" typeface="Plantagenet Cherokee"/>
+        <a:font script="Yiii" typeface="Microsoft Yi Baiti"/>
+        <a:font script="Tibt" typeface="Microsoft Himalaya"/>
+        <a:font script="Thaa" typeface="MV Boli"/>
+        <a:font script="Deva" typeface="Mangal"/>
+        <a:font script="Telu" typeface="Gautami"/>
+        <a:font script="Taml" typeface="Latha"/>
+        <a:font script="Syrc" typeface="Estrangelo Edessa"/>
+        <a:font script="Orya" typeface="Kalinga"/>
+        <a:font script="Mlym" typeface="Kartika"/>
+        <a:font script="Laoo" typeface="DokChampa"/>
+        <a:font script="Sinh" typeface="Iskoola Pota"/>
+        <a:font script="Mong" typeface="Mongolian Baiti"/>
+        <a:font script="Viet" typeface="Times New Roman"/>
+        <a:font script="Uigh" typeface="Microsoft Uighur"/>
+        <a:font script="Geor" typeface="Sylfaen"/>
+        <a:font script="Armn" typeface="Arial"/>
+        <a:font script="Bugi" typeface="Leelawadee UI"/>
+        <a:font script="Bopo" typeface="Microsoft JhengHei"/>
+        <a:font script="Java" typeface="Javanese Text"/>
+        <a:font script="Lisu" typeface="Segoe UI"/>
+        <a:font script="Mymr" typeface="Myanmar Text"/>
+        <a:font script="Nkoo" typeface="Ebrima"/>
+        <a:font script="Olck" typeface="Nirmala UI"/>
+        <a:font script="Osma" typeface="Ebrima"/>
+        <a:font script="Phag" typeface="Phagspa"/>
+        <a:font script="Syrn" typeface="Estrangelo Edessa"/>
+        <a:font script="Syrj" typeface="Estrangelo Edessa"/>
+        <a:font script="Syre" typeface="Estrangelo Edessa"/>
+        <a:font script="Sora" typeface="Nirmala UI"/>
+        <a:font script="Tale" typeface="Microsoft Tai Le"/>
+        <a:font script="Talu" typeface="Microsoft New Tai Lue"/>
+        <a:font script="Tfng" typeface="Ebrima"/>
+      </a:majorFont>
+      <a:minorFont>
+        <a:latin typeface="Aptos" panose="02110004020202020204"/>
+        <a:ea typeface=""/>
+        <a:cs typeface=""/>
+        <a:font script="Jpan" typeface="游ゴシック"/>
+        <a:font script="Hang" typeface="맑은 고딕"/>
+        <a:font script="Hans" typeface="等线"/>
+        <a:font script="Hant" typeface="新細明體"/>
+        <a:font script="Arab" typeface="Arial"/>
+        <a:font script="Hebr" typeface="Arial"/>
+        <a:font script="Thai" typeface="Cordia New"/>
+        <a:font script="Ethi" typeface="Nyala"/>
+        <a:font script="Beng" typeface="Vrinda"/>
+        <a:font script="Gujr" typeface="Shruti"/>
+        <a:font script="Khmr" typeface="DaunPenh"/>
+        <a:font script="Knda" typeface="Tunga"/>
+        <a:font script="Guru" typeface="Raavi"/>
+        <a:font script="Cans" typeface="Euphemia"/>
+        <a:font script="Cher" typeface="Plantagenet Cherokee"/>
+        <a:font script="Yiii" typeface="Microsoft Yi Baiti"/>
+        <a:font script="Tibt" typeface="Microsoft Himalaya"/>
+        <a:font script="Thaa" typeface="MV Boli"/>
+        <a:font script="Deva" typeface="Mangal"/>
+        <a:font script="Telu" typeface="Gautami"/>
+        <a:font script="Taml" typeface="Latha"/>
+        <a:font script="Syrc" typeface="Estrangelo Edessa"/>
+        <a:font script="Orya" typeface="Kalinga"/>
+        <a:font script="Mlym" typeface="Kartika"/>
+        <a:font script="Laoo" typeface="DokChampa"/>
+        <a:font script="Sinh" typeface="Iskoola Pota"/>
+        <a:font script="Mong" typeface="Mongolian Baiti"/>
+        <a:font script="Viet" typeface="Arial"/>
+        <a:font script="Uigh" typeface="Microsoft Uighur"/>
+        <a:font script="Geor" typeface="Sylfaen"/>
+        <a:font script="Armn" typeface="Arial"/>
+        <a:font script="Bugi" typeface="Leelawadee UI"/>
+        <a:font script="Bopo" typeface="Microsoft JhengHei"/>
+        <a:font script="Java" typeface="Javanese Text"/>
+        <a:font script="Lisu" typeface="Segoe UI"/>
+        <a:font script="Mymr" typeface="Myanmar Text"/>
+        <a:font script="Nkoo" typeface="Ebrima"/>
+        <a:font script="Olck" typeface="Nirmala UI"/>
+        <a:font script="Osma" typeface="Ebrima"/>
+        <a:font script="Phag" typeface="Phagspa"/>
+        <a:font script="Syrn" typeface="Estrangelo Edessa"/>
+        <a:font script="Syrj" typeface="Estrangelo Edessa"/>
+        <a:font script="Syre" typeface="Estrangelo Edessa"/>
+        <a:font script="Sora" typeface="Nirmala UI"/>
+        <a:font script="Tale" typeface="Microsoft Tai Le"/>
+        <a:font script="Talu" typeface="Microsoft New Tai Lue"/>
+        <a:font script="Tfng" typeface="Ebrima"/>
+      </a:minorFont>
+    </a:fontScheme>
+    <a:fmtScheme name="Office">
+      <a:fillStyleLst>
+        <a:solidFill>
+          <a:schemeClr val="phClr"/>
+        </a:solidFill>
+        <a:gradFill rotWithShape="1">
+          <a:gsLst>
+            <a:gs pos="0">
+              <a:schemeClr val="phClr">
+                <a:lumMod val="110000"/>
+                <a:satMod val="105000"/>
+                <a:tint val="67000"/>
+              </a:schemeClr>
+            </a:gs>
+            <a:gs pos="50000">
+              <a:schemeClr val="phClr">
+                <a:lumMod val="105000"/>
+                <a:satMod val="103000"/>
+                <a:tint val="73000"/>
+              </a:schemeClr>
+            </a:gs>
+            <a:gs pos="100000">
+              <a:schemeClr val="phClr">
+                <a:lumMod val="105000"/>
+                <a:satMod val="109000"/>
+                <a:tint val="81000"/>
+              </a:schemeClr>
+            </a:gs>
+          </a:gsLst>
+          <a:lin ang="5400000" scaled="0"/>
+        </a:gradFill>
+        <a:gradFill rotWithShape="1">
+          <a:gsLst>
+            <a:gs pos="0">
+              <a:schemeClr val="phClr">
+                <a:satMod val="103000"/>
+                <a:lumMod val="102000"/>
+                <a:tint val="94000"/>
+              </a:schemeClr>
+            </a:gs>
+            <a:gs pos="50000">
+              <a:schemeClr val="phClr">
+                <a:satMod val="110000"/>
+                <a:lumMod val="100000"/>
+                <a:shade val="100000"/>
+              </a:schemeClr>
+            </a:gs>
+            <a:gs pos="100000">
+              <a:schemeClr val="phClr">
+                <a:lumMod val="99000"/>
+                <a:satMod val="120000"/>
+                <a:shade val="78000"/>
+              </a:schemeClr>
+            </a:gs>
+          </a:gsLst>
+          <a:lin ang="5400000" scaled="0"/>
+        </a:gradFill>
+      </a:fillStyleLst>
+      <a:lnStyleLst>
+        <a:ln w="12700" cap="flat" cmpd="sng" algn="ctr">
+          <a:solidFill>
+            <a:schemeClr val="phClr"/>
+          </a:solidFill>
+          <a:prstDash val="solid"/>
+          <a:miter lim="800000"/>
+        </a:ln>
+        <a:ln w="19050" cap="flat" cmpd="sng" algn="ctr">
+          <a:solidFill>
+            <a:schemeClr val="phClr"/>
+          </a:solidFill>
+          <a:prstDash val="solid"/>
+          <a:miter lim="800000"/>
+        </a:ln>
+        <a:ln w="25400" cap="flat" cmpd="sng" algn="ctr">
+          <a:solidFill>
+            <a:schemeClr val="phClr"/>
+          </a:solidFill>
+          <a:prstDash val="solid"/>
+          <a:miter lim="800000"/>
+        </a:ln>
+      </a:lnStyleLst>
+      <a:effectStyleLst>
+        <a:effectStyle>
+          <a:effectLst/>
+        </a:effectStyle>
+        <a:effectStyle>
+          <a:effectLst/>
+        </a:effectStyle>
+        <a:effectStyle>
+          <a:effectLst>
+            <a:outerShdw blurRad="57150" dist="19050" dir="5400000" algn="ctr" rotWithShape="0">
+              <a:srgbClr val="000000">
+                <a:alpha val="63000"/>
+              </a:srgbClr>
+            </a:outerShdw>
+          </a:effectLst>
+        </a:effectStyle>
+      </a:effectStyleLst>
+      <a:bgFillStyleLst>
+        <a:solidFill>
+          <a:schemeClr val="phClr"/>
+        </a:solidFill>
+        <a:solidFill>
+          <a:schemeClr val="phClr">
+            <a:tint val="95000"/>
+            <a:satMod val="170000"/>
+          </a:schemeClr>
+        </a:solidFill>
+        <a:gradFill rotWithShape="1">
+          <a:gsLst>
+            <a:gs pos="0">
+              <a:schemeClr val="phClr">
+                <a:tint val="93000"/>
+                <a:satMod val="150000"/>
+                <a:shade val="98000"/>
+                <a:lumMod val="102000"/>
+              </a:schemeClr>
+            </a:gs>
+            <a:gs pos="50000">
+              <a:schemeClr val="phClr">
+                <a:tint val="98000"/>
+                <a:satMod val="130000"/>
+                <a:shade val="90000"/>
+                <a:lumMod val="103000"/>
+              </a:schemeClr>
+            </a:gs>
+            <a:gs pos="100000">
+              <a:schemeClr val="phClr">
+                <a:shade val="63000"/>
+                <a:satMod val="120000"/>
+              </a:schemeClr>
+            </a:gs>
+          </a:gsLst>
+          <a:lin ang="5400000" scaled="0"/>
+        </a:gradFill>
+      </a:bgFillStyleLst>
+    </a:fmtScheme>
+  </a:themeElements>
+  <a:objectDefaults>
+    <a:lnDef>
+      <a:spPr/>
+      <a:bodyPr/>
+      <a:lstStyle/>
+      <a:style>
+        <a:lnRef idx="2">
+          <a:schemeClr val="accent1"/>
+        </a:lnRef>
+        <a:fillRef idx="0">
+          <a:schemeClr val="accent1"/>
+        </a:fillRef>
+        <a:effectRef idx="1">
+          <a:schemeClr val="accent1"/>
+        </a:effectRef>
+        <a:fontRef idx="minor">
+          <a:schemeClr val="tx1"/>
+        </a:fontRef>
+      </a:style>
+    </a:lnDef>
+  </a:objectDefaults>
+  <a:extraClrSchemeLst/>
+  <a:extLst>
+    <a:ext uri="{05A4C25C-085E-4340-85A3-A5531E510DB2}">
+      <thm15:themeFamily xmlns:thm15="http://schemas.microsoft.com/office/thememl/2012/main" name="Office Theme" id="{2E142A2C-CD16-42D6-873A-C26D2A0506FA}" vid="{1BDDFF52-6CD6-40A5-AB3C-68EB2F1E4D0A}"/>
+    </a:ext>
+  </a:extLst>
+</a:theme>
 </file>
</xml_diff>

<commit_message>
Extended to 40 movies
</commit_message>
<xml_diff>
--- a/Documentation/Final Presentation Slides.pptx
+++ b/Documentation/Final Presentation Slides.pptx
@@ -142,30 +142,6 @@
 
 <file path=ppt/changesInfos/changesInfo1.xml><?xml version="1.0" encoding="utf-8"?>
 <pc:chgInfo xmlns:a="http://schemas.openxmlformats.org/drawingml/2006/main" xmlns:r="http://schemas.openxmlformats.org/officeDocument/2006/relationships" xmlns:ac="http://schemas.microsoft.com/office/drawing/2013/main/command" xmlns:pc="http://schemas.microsoft.com/office/powerpoint/2013/main/command">
-  <pc:docChgLst>
-    <pc:chgData name="Darien Walker" userId="S::dwal1641@students.vsu.edu::47bc5b70-f244-4f40-b1f1-076c4d9f0e1b" providerId="AD" clId="Web-{760AFDC9-3F23-AA3E-AD88-FA76E65A2519}"/>
-    <pc:docChg chg="modSld">
-      <pc:chgData name="Darien Walker" userId="S::dwal1641@students.vsu.edu::47bc5b70-f244-4f40-b1f1-076c4d9f0e1b" providerId="AD" clId="Web-{760AFDC9-3F23-AA3E-AD88-FA76E65A2519}" dt="2025-11-18T20:45:45.531" v="23"/>
-      <pc:docMkLst>
-        <pc:docMk/>
-      </pc:docMkLst>
-      <pc:sldChg chg="addSp delSp modSp mod setBg modNotes">
-        <pc:chgData name="Darien Walker" userId="S::dwal1641@students.vsu.edu::47bc5b70-f244-4f40-b1f1-076c4d9f0e1b" providerId="AD" clId="Web-{760AFDC9-3F23-AA3E-AD88-FA76E65A2519}" dt="2025-11-18T20:45:45.531" v="23"/>
-        <pc:sldMkLst>
-          <pc:docMk/>
-          <pc:sldMk cId="2387232387" sldId="265"/>
-        </pc:sldMkLst>
-        <pc:picChg chg="add del mod modCrop">
-          <ac:chgData name="Darien Walker" userId="S::dwal1641@students.vsu.edu::47bc5b70-f244-4f40-b1f1-076c4d9f0e1b" providerId="AD" clId="Web-{760AFDC9-3F23-AA3E-AD88-FA76E65A2519}" dt="2025-11-18T20:31:54.751" v="20" actId="1076"/>
-          <ac:picMkLst>
-            <pc:docMk/>
-            <pc:sldMk cId="2387232387" sldId="265"/>
-            <ac:picMk id="5" creationId="{B3C86C18-6E9F-0DF9-1B66-1E117AA7D9B4}"/>
-          </ac:picMkLst>
-        </pc:picChg>
-      </pc:sldChg>
-    </pc:docChg>
-  </pc:docChgLst>
   <pc:docChgLst>
     <pc:chgData name="Hunter T Smith" userId="85048cc5-0361-478c-b7ab-429a8b03b5c9" providerId="ADAL" clId="{EE23C152-F5A7-494E-894C-B664F80D40D8}"/>
     <pc:docChg chg="undo custSel mod addSld delSld modSld sldOrd">
@@ -1249,6 +1225,30 @@
             <ac:spMk id="4" creationId="{9F5191A0-07CA-8920-D644-575723A6AAAE}"/>
           </ac:spMkLst>
         </pc:spChg>
+      </pc:sldChg>
+    </pc:docChg>
+  </pc:docChgLst>
+  <pc:docChgLst>
+    <pc:chgData name="Darien Walker" userId="S::dwal1641@students.vsu.edu::47bc5b70-f244-4f40-b1f1-076c4d9f0e1b" providerId="AD" clId="Web-{760AFDC9-3F23-AA3E-AD88-FA76E65A2519}"/>
+    <pc:docChg chg="modSld">
+      <pc:chgData name="Darien Walker" userId="S::dwal1641@students.vsu.edu::47bc5b70-f244-4f40-b1f1-076c4d9f0e1b" providerId="AD" clId="Web-{760AFDC9-3F23-AA3E-AD88-FA76E65A2519}" dt="2025-11-18T20:45:45.531" v="23"/>
+      <pc:docMkLst>
+        <pc:docMk/>
+      </pc:docMkLst>
+      <pc:sldChg chg="addSp delSp modSp mod setBg modNotes">
+        <pc:chgData name="Darien Walker" userId="S::dwal1641@students.vsu.edu::47bc5b70-f244-4f40-b1f1-076c4d9f0e1b" providerId="AD" clId="Web-{760AFDC9-3F23-AA3E-AD88-FA76E65A2519}" dt="2025-11-18T20:45:45.531" v="23"/>
+        <pc:sldMkLst>
+          <pc:docMk/>
+          <pc:sldMk cId="2387232387" sldId="265"/>
+        </pc:sldMkLst>
+        <pc:picChg chg="add del mod modCrop">
+          <ac:chgData name="Darien Walker" userId="S::dwal1641@students.vsu.edu::47bc5b70-f244-4f40-b1f1-076c4d9f0e1b" providerId="AD" clId="Web-{760AFDC9-3F23-AA3E-AD88-FA76E65A2519}" dt="2025-11-18T20:31:54.751" v="20" actId="1076"/>
+          <ac:picMkLst>
+            <pc:docMk/>
+            <pc:sldMk cId="2387232387" sldId="265"/>
+            <ac:picMk id="5" creationId="{B3C86C18-6E9F-0DF9-1B66-1E117AA7D9B4}"/>
+          </ac:picMkLst>
+        </pc:picChg>
       </pc:sldChg>
     </pc:docChg>
   </pc:docChgLst>
@@ -6744,7 +6744,7 @@
           <a:lstStyle/>
           <a:p>
             <a:r>
-              <a:rPr lang="en-US" dirty="0"/>
+              <a:rPr lang="en-US"/>
               <a:t>It’s simple, there is too many movies out there which go under the radar. We don’t want to waste the few free hours searching through a million movies or even worse, watching a bad movie.</a:t>
             </a:r>
           </a:p>
@@ -6831,13 +6831,13 @@
           <a:lstStyle/>
           <a:p>
             <a:r>
-              <a:rPr lang="en-US" dirty="0"/>
+              <a:rPr lang="en-US"/>
               <a:t>AI Machine Learning! Instead of spending endless time searching for new movies. We can use AI Machine Learning to find good matches based on a users’ likes!</a:t>
             </a:r>
           </a:p>
           <a:p>
             <a:r>
-              <a:rPr lang="en-US" dirty="0"/>
+              <a:rPr lang="en-US"/>
               <a:t>This project seeks to solve the problem of content overload by delivering accurate, personalized movie recommendations that improve user experience, reduce browsing time, and enhance overall satisfaction.</a:t>
             </a:r>
           </a:p>
@@ -6924,27 +6924,27 @@
           <a:lstStyle/>
           <a:p>
             <a:r>
-              <a:rPr lang="en-US" dirty="0"/>
+              <a:rPr lang="en-US"/>
               <a:t>This script trains a </a:t>
             </a:r>
             <a:r>
-              <a:rPr lang="en-US" b="1" dirty="0"/>
+              <a:rPr lang="en-US" b="1"/>
               <a:t>movie recommendation model</a:t>
             </a:r>
             <a:r>
-              <a:rPr lang="en-US" dirty="0"/>
+              <a:rPr lang="en-US"/>
               <a:t> using </a:t>
             </a:r>
             <a:r>
-              <a:rPr lang="en-US" b="1" dirty="0"/>
+              <a:rPr lang="en-US" b="1"/>
               <a:t>SVD (Singular Value Decomposition)</a:t>
             </a:r>
             <a:r>
-              <a:rPr lang="en-US" dirty="0"/>
+              <a:rPr lang="en-US"/>
               <a:t> from the </a:t>
             </a:r>
             <a:r>
-              <a:rPr lang="en-US" sz="1200" kern="1200" dirty="0">
+              <a:rPr lang="en-US" sz="1200" kern="1200">
                 <a:solidFill>
                   <a:schemeClr val="tx1"/>
                 </a:solidFill>
@@ -6955,84 +6955,84 @@
               <a:t>surprise</a:t>
             </a:r>
             <a:r>
-              <a:rPr lang="en-US" dirty="0"/>
+              <a:rPr lang="en-US"/>
               <a:t> ML library.</a:t>
             </a:r>
             <a:br>
-              <a:rPr lang="en-US" dirty="0"/>
+              <a:rPr lang="en-US"/>
             </a:br>
             <a:r>
-              <a:rPr lang="en-US" dirty="0"/>
+              <a:rPr lang="en-US"/>
               <a:t>It learns which movies users </a:t>
             </a:r>
             <a:r>
-              <a:rPr lang="en-US" i="1" dirty="0"/>
+              <a:rPr lang="en-US" i="1"/>
               <a:t>might</a:t>
             </a:r>
             <a:r>
-              <a:rPr lang="en-US" dirty="0"/>
+              <a:rPr lang="en-US"/>
               <a:t> like based on what they already liked.</a:t>
             </a:r>
           </a:p>
           <a:p>
             <a:r>
-              <a:rPr lang="en-US" dirty="0"/>
+              <a:rPr lang="en-US"/>
               <a:t>Then it saves predicted recommendations into a </a:t>
             </a:r>
             <a:r>
-              <a:rPr lang="en-US" dirty="0" err="1"/>
+              <a:rPr lang="en-US" err="1"/>
               <a:t>Supabase</a:t>
             </a:r>
             <a:r>
-              <a:rPr lang="en-US" dirty="0"/>
+              <a:rPr lang="en-US"/>
               <a:t> table.</a:t>
             </a:r>
           </a:p>
           <a:p>
             <a:br>
-              <a:rPr lang="en-US" dirty="0"/>
+              <a:rPr lang="en-US"/>
             </a:br>
             <a:r>
-              <a:rPr lang="en-US" i="1" dirty="0"/>
+              <a:rPr lang="en-US" i="1"/>
               <a:t>learns</a:t>
             </a:r>
             <a:r>
-              <a:rPr lang="en-US" dirty="0"/>
+              <a:rPr lang="en-US"/>
               <a:t> user latent factors</a:t>
             </a:r>
           </a:p>
           <a:p>
             <a:r>
-              <a:rPr lang="en-US" i="1" dirty="0"/>
+              <a:rPr lang="en-US" i="1"/>
               <a:t>learns</a:t>
             </a:r>
             <a:r>
-              <a:rPr lang="en-US" dirty="0"/>
+              <a:rPr lang="en-US"/>
               <a:t> movie latent factors</a:t>
             </a:r>
           </a:p>
           <a:p>
             <a:r>
-              <a:rPr lang="en-US" dirty="0"/>
+              <a:rPr lang="en-US"/>
               <a:t>uses stochastic </a:t>
             </a:r>
             <a:r>
-              <a:rPr lang="en-US" b="1" dirty="0"/>
+              <a:rPr lang="en-US" b="1"/>
               <a:t>gradient descent</a:t>
             </a:r>
             <a:r>
-              <a:rPr lang="en-US" dirty="0"/>
+              <a:rPr lang="en-US"/>
               <a:t> to minimize prediction error</a:t>
             </a:r>
           </a:p>
           <a:p>
             <a:r>
-              <a:rPr lang="en-US" dirty="0"/>
+              <a:rPr lang="en-US"/>
               <a:t>predicts user ratings for unseen movies</a:t>
             </a:r>
           </a:p>
           <a:p>
-            <a:endParaRPr lang="en-US" dirty="0"/>
+            <a:endParaRPr lang="en-US"/>
           </a:p>
         </p:txBody>
       </p:sp>
@@ -7117,46 +7117,46 @@
           <a:lstStyle/>
           <a:p>
             <a:r>
-              <a:rPr lang="en-US" dirty="0"/>
+              <a:rPr lang="en-US"/>
               <a:t>#9 – Skips already liked, uses SVD score, checks how many genres match, 	</a:t>
             </a:r>
             <a:r>
-              <a:rPr lang="en-US" dirty="0" err="1"/>
+              <a:rPr lang="en-US" err="1"/>
               <a:t>tmdb</a:t>
             </a:r>
             <a:r>
-              <a:rPr lang="en-US" dirty="0"/>
+              <a:rPr lang="en-US"/>
               <a:t> rating, combines into hybrid score.</a:t>
             </a:r>
             <a:br>
-              <a:rPr lang="en-US" dirty="0"/>
+              <a:rPr lang="en-US"/>
             </a:br>
             <a:r>
-              <a:rPr lang="en-US" dirty="0"/>
+              <a:rPr lang="en-US"/>
               <a:t>Result </a:t>
             </a:r>
             <a:r>
-              <a:rPr lang="en-US" b="1" dirty="0"/>
+              <a:rPr lang="en-US" b="1"/>
               <a:t>✔️ Collaborative filtering (SVD)</a:t>
             </a:r>
           </a:p>
           <a:p>
             <a:r>
-              <a:rPr lang="en-US" b="1" dirty="0"/>
+              <a:rPr lang="en-US" b="1"/>
               <a:t>✔️ Content-based filtering (genres)</a:t>
             </a:r>
           </a:p>
           <a:p>
             <a:r>
-              <a:rPr lang="en-US" b="1" dirty="0"/>
+              <a:rPr lang="en-US" b="1"/>
               <a:t>✔️ Popularity ranking (TMDB rating)</a:t>
             </a:r>
           </a:p>
           <a:p>
-            <a:endParaRPr lang="en-US" dirty="0"/>
-          </a:p>
-          <a:p>
-            <a:endParaRPr lang="en-US" dirty="0"/>
+            <a:endParaRPr lang="en-US"/>
+          </a:p>
+          <a:p>
+            <a:endParaRPr lang="en-US"/>
           </a:p>
         </p:txBody>
       </p:sp>
@@ -7241,7 +7241,7 @@
           <a:lstStyle/>
           <a:p>
             <a:r>
-              <a:rPr lang="en-US" dirty="0"/>
+              <a:rPr lang="en-US"/>
               <a:t>whether the system recommends movies across many genres</a:t>
             </a:r>
           </a:p>
@@ -7328,7 +7328,7 @@
           <a:lstStyle/>
           <a:p>
             <a:r>
-              <a:rPr lang="en-US" dirty="0"/>
+              <a:rPr lang="en-US"/>
               <a:t>ensuring movies the user already liked are excluded</a:t>
             </a:r>
           </a:p>
@@ -7415,7 +7415,7 @@
           <a:lstStyle/>
           <a:p>
             <a:r>
-              <a:rPr lang="en-US" dirty="0"/>
+              <a:rPr lang="en-US"/>
               <a:t>runtime and scalability when analyzing large TMDB datasets</a:t>
             </a:r>
           </a:p>
@@ -10825,7 +10825,7 @@
           <a:p>
             <a:pPr algn="l"/>
             <a:r>
-              <a:rPr lang="en-US" sz="2000" dirty="0">
+              <a:rPr lang="en-US" sz="2000">
                 <a:solidFill>
                   <a:srgbClr val="FFFFFF"/>
                 </a:solidFill>
@@ -12792,10 +12792,10 @@
           <a:lstStyle/>
           <a:p>
             <a:r>
-              <a:rPr lang="en-US" sz="3400" b="1" dirty="0"/>
+              <a:rPr lang="en-US" sz="3400" b="1"/>
               <a:t>Quality of recommended movies</a:t>
             </a:r>
-            <a:endParaRPr lang="en-US" sz="3400" dirty="0"/>
+            <a:endParaRPr lang="en-US" sz="3400"/>
           </a:p>
         </p:txBody>
       </p:sp>
@@ -12828,7 +12828,7 @@
           <a:lstStyle/>
           <a:p>
             <a:r>
-              <a:rPr lang="en-US" sz="2000" dirty="0"/>
+              <a:rPr lang="en-US" sz="2000"/>
               <a:t>Quality movies are being recommended but Quality of movies recommended are not catered enough to user.</a:t>
             </a:r>
           </a:p>
@@ -12999,68 +12999,68 @@
           <a:custGeom>
             <a:avLst/>
             <a:gdLst>
-              <a:gd name="connsiteX0" fmla="*/ 0 w 3255095"/>
-              <a:gd name="connsiteY0" fmla="*/ 0 h 18288"/>
-              <a:gd name="connsiteX1" fmla="*/ 618468 w 3255095"/>
-              <a:gd name="connsiteY1" fmla="*/ 0 h 18288"/>
-              <a:gd name="connsiteX2" fmla="*/ 1269487 w 3255095"/>
-              <a:gd name="connsiteY2" fmla="*/ 0 h 18288"/>
-              <a:gd name="connsiteX3" fmla="*/ 1953057 w 3255095"/>
-              <a:gd name="connsiteY3" fmla="*/ 0 h 18288"/>
-              <a:gd name="connsiteX4" fmla="*/ 2636627 w 3255095"/>
-              <a:gd name="connsiteY4" fmla="*/ 0 h 18288"/>
-              <a:gd name="connsiteX5" fmla="*/ 3255095 w 3255095"/>
-              <a:gd name="connsiteY5" fmla="*/ 0 h 18288"/>
-              <a:gd name="connsiteX6" fmla="*/ 3255095 w 3255095"/>
-              <a:gd name="connsiteY6" fmla="*/ 18288 h 18288"/>
-              <a:gd name="connsiteX7" fmla="*/ 2538974 w 3255095"/>
-              <a:gd name="connsiteY7" fmla="*/ 18288 h 18288"/>
-              <a:gd name="connsiteX8" fmla="*/ 1822853 w 3255095"/>
-              <a:gd name="connsiteY8" fmla="*/ 18288 h 18288"/>
-              <a:gd name="connsiteX9" fmla="*/ 1171834 w 3255095"/>
-              <a:gd name="connsiteY9" fmla="*/ 18288 h 18288"/>
-              <a:gd name="connsiteX10" fmla="*/ 0 w 3255095"/>
-              <a:gd name="connsiteY10" fmla="*/ 18288 h 18288"/>
-              <a:gd name="connsiteX11" fmla="*/ 0 w 3255095"/>
-              <a:gd name="connsiteY11" fmla="*/ 0 h 18288"/>
+              <a:gd name="csX0" fmla="*/ 0 w 3255095"/>
+              <a:gd name="csY0" fmla="*/ 0 h 18288"/>
+              <a:gd name="csX1" fmla="*/ 618468 w 3255095"/>
+              <a:gd name="csY1" fmla="*/ 0 h 18288"/>
+              <a:gd name="csX2" fmla="*/ 1269487 w 3255095"/>
+              <a:gd name="csY2" fmla="*/ 0 h 18288"/>
+              <a:gd name="csX3" fmla="*/ 1953057 w 3255095"/>
+              <a:gd name="csY3" fmla="*/ 0 h 18288"/>
+              <a:gd name="csX4" fmla="*/ 2636627 w 3255095"/>
+              <a:gd name="csY4" fmla="*/ 0 h 18288"/>
+              <a:gd name="csX5" fmla="*/ 3255095 w 3255095"/>
+              <a:gd name="csY5" fmla="*/ 0 h 18288"/>
+              <a:gd name="csX6" fmla="*/ 3255095 w 3255095"/>
+              <a:gd name="csY6" fmla="*/ 18288 h 18288"/>
+              <a:gd name="csX7" fmla="*/ 2538974 w 3255095"/>
+              <a:gd name="csY7" fmla="*/ 18288 h 18288"/>
+              <a:gd name="csX8" fmla="*/ 1822853 w 3255095"/>
+              <a:gd name="csY8" fmla="*/ 18288 h 18288"/>
+              <a:gd name="csX9" fmla="*/ 1171834 w 3255095"/>
+              <a:gd name="csY9" fmla="*/ 18288 h 18288"/>
+              <a:gd name="csX10" fmla="*/ 0 w 3255095"/>
+              <a:gd name="csY10" fmla="*/ 18288 h 18288"/>
+              <a:gd name="csX11" fmla="*/ 0 w 3255095"/>
+              <a:gd name="csY11" fmla="*/ 0 h 18288"/>
             </a:gdLst>
             <a:ahLst/>
             <a:cxnLst>
               <a:cxn ang="0">
-                <a:pos x="connsiteX0" y="connsiteY0"/>
+                <a:pos x="csX0" y="csY0"/>
               </a:cxn>
               <a:cxn ang="0">
-                <a:pos x="connsiteX1" y="connsiteY1"/>
+                <a:pos x="csX1" y="csY1"/>
               </a:cxn>
               <a:cxn ang="0">
-                <a:pos x="connsiteX2" y="connsiteY2"/>
+                <a:pos x="csX2" y="csY2"/>
               </a:cxn>
               <a:cxn ang="0">
-                <a:pos x="connsiteX3" y="connsiteY3"/>
+                <a:pos x="csX3" y="csY3"/>
               </a:cxn>
               <a:cxn ang="0">
-                <a:pos x="connsiteX4" y="connsiteY4"/>
+                <a:pos x="csX4" y="csY4"/>
               </a:cxn>
               <a:cxn ang="0">
-                <a:pos x="connsiteX5" y="connsiteY5"/>
+                <a:pos x="csX5" y="csY5"/>
               </a:cxn>
               <a:cxn ang="0">
-                <a:pos x="connsiteX6" y="connsiteY6"/>
+                <a:pos x="csX6" y="csY6"/>
               </a:cxn>
               <a:cxn ang="0">
-                <a:pos x="connsiteX7" y="connsiteY7"/>
+                <a:pos x="csX7" y="csY7"/>
               </a:cxn>
               <a:cxn ang="0">
-                <a:pos x="connsiteX8" y="connsiteY8"/>
+                <a:pos x="csX8" y="csY8"/>
               </a:cxn>
               <a:cxn ang="0">
-                <a:pos x="connsiteX9" y="connsiteY9"/>
+                <a:pos x="csX9" y="csY9"/>
               </a:cxn>
               <a:cxn ang="0">
-                <a:pos x="connsiteX10" y="connsiteY10"/>
+                <a:pos x="csX10" y="csY10"/>
               </a:cxn>
               <a:cxn ang="0">
-                <a:pos x="connsiteX11" y="connsiteY11"/>
+                <a:pos x="csX11" y="csY11"/>
               </a:cxn>
             </a:cxnLst>
             <a:rect l="l" t="t" r="r" b="b"/>
@@ -13273,14 +13273,14 @@
               <a:buNone/>
             </a:pPr>
             <a:r>
-              <a:rPr lang="en-US" sz="2200" dirty="0"/>
+              <a:rPr lang="en-US" sz="2200"/>
               <a:t>The recommendations are spread across multiple genres including Comedy, Action, Sci-Fi, Romance, </a:t>
             </a:r>
             <a:r>
-              <a:rPr lang="en-US" sz="2200" dirty="0" err="1"/>
+              <a:rPr lang="en-US" sz="2200" err="1"/>
               <a:t>etc</a:t>
             </a:r>
-            <a:endParaRPr lang="en-US" sz="2200" dirty="0"/>
+            <a:endParaRPr lang="en-US" sz="2200"/>
           </a:p>
         </p:txBody>
       </p:sp>
@@ -16565,23 +16565,18 @@
           <a:lstStyle/>
           <a:p>
             <a:r>
-              <a:rPr lang="en-US" sz="2000" dirty="0"/>
+              <a:rPr lang="en-US" sz="2000"/>
               <a:t>Recommendation Model runs quick between 20-50 popular pages. 500 pages (14,000 movies) can take a larger amount of time. Low</a:t>
             </a:r>
           </a:p>
           <a:p>
-            <a:endParaRPr lang="en-US" sz="2000" dirty="0"/>
-          </a:p>
-          <a:p>
-            <a:r>
-              <a:rPr lang="en-US" sz="2000" dirty="0"/>
-              <a:t>Improved algorithms would be needed with large </a:t>
-            </a:r>
+            <a:endParaRPr lang="en-US" sz="2000"/>
+          </a:p>
+          <a:p>
             <a:r>
               <a:rPr lang="en-US" sz="2000"/>
-              <a:t>user scaling.</a:t>
-            </a:r>
-            <a:endParaRPr lang="en-US" sz="2000" dirty="0"/>
+              <a:t>Improved algorithms would be needed with large user scaling.</a:t>
+            </a:r>
           </a:p>
         </p:txBody>
       </p:sp>
@@ -16675,7 +16670,7 @@
           <a:lstStyle/>
           <a:p>
             <a:r>
-              <a:rPr lang="en-US" dirty="0"/>
+              <a:rPr lang="en-US"/>
               <a:t>Overall Results and Analysis </a:t>
             </a:r>
           </a:p>
@@ -16761,12 +16756,12 @@
               <a:buNone/>
             </a:pPr>
             <a:r>
-              <a:rPr lang="en-US" altLang="en-US" sz="2000" b="1" dirty="0">
+              <a:rPr lang="en-US" altLang="en-US" sz="2000" b="1">
                 <a:latin typeface="Arial" panose="020B0604020202020204" pitchFamily="34" charset="0"/>
               </a:rPr>
               <a:t>Pros</a:t>
             </a:r>
-            <a:endParaRPr kumimoji="0" lang="en-US" altLang="en-US" sz="2000" b="1" i="0" u="none" strike="noStrike" cap="none" normalizeH="0" baseline="0" dirty="0">
+            <a:endParaRPr kumimoji="0" lang="en-US" altLang="en-US" sz="2000" b="1" i="0" u="none" strike="noStrike" cap="none" normalizeH="0" baseline="0">
               <a:ln>
                 <a:noFill/>
               </a:ln>
@@ -16790,7 +16785,7 @@
               </a:spcAft>
             </a:pPr>
             <a:r>
-              <a:rPr kumimoji="0" lang="en-US" altLang="en-US" sz="2000" b="0" i="0" u="none" strike="noStrike" cap="none" normalizeH="0" baseline="0" dirty="0">
+              <a:rPr kumimoji="0" lang="en-US" altLang="en-US" sz="2000" b="0" i="0" u="none" strike="noStrike" cap="none" normalizeH="0" baseline="0">
                 <a:ln>
                   <a:noFill/>
                 </a:ln>
@@ -16816,7 +16811,7 @@
               </a:spcAft>
             </a:pPr>
             <a:r>
-              <a:rPr kumimoji="0" lang="en-US" altLang="en-US" sz="2000" b="0" i="0" u="none" strike="noStrike" cap="none" normalizeH="0" baseline="0" dirty="0">
+              <a:rPr kumimoji="0" lang="en-US" altLang="en-US" sz="2000" b="0" i="0" u="none" strike="noStrike" cap="none" normalizeH="0" baseline="0">
                 <a:ln>
                   <a:noFill/>
                 </a:ln>
@@ -16842,7 +16837,7 @@
               </a:spcAft>
             </a:pPr>
             <a:r>
-              <a:rPr kumimoji="0" lang="en-US" altLang="en-US" sz="2000" b="0" i="0" u="none" strike="noStrike" cap="none" normalizeH="0" baseline="0" dirty="0">
+              <a:rPr kumimoji="0" lang="en-US" altLang="en-US" sz="2000" b="0" i="0" u="none" strike="noStrike" cap="none" normalizeH="0" baseline="0">
                 <a:ln>
                   <a:noFill/>
                 </a:ln>
@@ -16868,7 +16863,7 @@
               </a:spcAft>
             </a:pPr>
             <a:r>
-              <a:rPr kumimoji="0" lang="en-US" altLang="en-US" sz="2000" b="0" i="0" u="none" strike="noStrike" cap="none" normalizeH="0" baseline="0" dirty="0">
+              <a:rPr kumimoji="0" lang="en-US" altLang="en-US" sz="2000" b="0" i="0" u="none" strike="noStrike" cap="none" normalizeH="0" baseline="0">
                 <a:ln>
                   <a:noFill/>
                 </a:ln>
@@ -16881,7 +16876,7 @@
               <a:t>Backend is stable: </a:t>
             </a:r>
             <a:r>
-              <a:rPr kumimoji="0" lang="en-US" altLang="en-US" sz="2000" b="0" i="0" u="none" strike="noStrike" cap="none" normalizeH="0" baseline="0" dirty="0" err="1">
+              <a:rPr kumimoji="0" lang="en-US" altLang="en-US" sz="2000" b="0" i="0" u="none" strike="noStrike" cap="none" normalizeH="0" baseline="0" err="1">
                 <a:ln>
                   <a:noFill/>
                 </a:ln>
@@ -16894,7 +16889,7 @@
               <a:t>Supabase</a:t>
             </a:r>
             <a:r>
-              <a:rPr kumimoji="0" lang="en-US" altLang="en-US" sz="2000" b="0" i="0" u="none" strike="noStrike" cap="none" normalizeH="0" baseline="0" dirty="0">
+              <a:rPr kumimoji="0" lang="en-US" altLang="en-US" sz="2000" b="0" i="0" u="none" strike="noStrike" cap="none" normalizeH="0" baseline="0">
                 <a:ln>
                   <a:noFill/>
                 </a:ln>
@@ -16920,7 +16915,7 @@
               </a:spcAft>
             </a:pPr>
             <a:r>
-              <a:rPr kumimoji="0" lang="en-US" altLang="en-US" sz="2000" b="0" i="0" u="none" strike="noStrike" cap="none" normalizeH="0" baseline="0" dirty="0">
+              <a:rPr kumimoji="0" lang="en-US" altLang="en-US" sz="2000" b="0" i="0" u="none" strike="noStrike" cap="none" normalizeH="0" baseline="0">
                 <a:ln>
                   <a:noFill/>
                 </a:ln>
@@ -16933,13 +16928,13 @@
               <a:t>User experience improves</a:t>
             </a:r>
             <a:r>
-              <a:rPr lang="en-US" altLang="en-US" sz="2000" dirty="0">
+              <a:rPr lang="en-US" altLang="en-US" sz="2000">
                 <a:latin typeface="Arial" panose="020B0604020202020204" pitchFamily="34" charset="0"/>
               </a:rPr>
               <a:t>. M</a:t>
             </a:r>
             <a:r>
-              <a:rPr kumimoji="0" lang="en-US" altLang="en-US" sz="2000" b="0" i="0" u="none" strike="noStrike" cap="none" normalizeH="0" baseline="0" dirty="0">
+              <a:rPr kumimoji="0" lang="en-US" altLang="en-US" sz="2000" b="0" i="0" u="none" strike="noStrike" cap="none" normalizeH="0" baseline="0">
                 <a:ln>
                   <a:noFill/>
                 </a:ln>
@@ -16965,7 +16960,7 @@
               </a:spcAft>
             </a:pPr>
             <a:r>
-              <a:rPr kumimoji="0" lang="en-US" altLang="en-US" sz="2000" b="0" i="0" u="none" strike="noStrike" cap="none" normalizeH="0" baseline="0" dirty="0">
+              <a:rPr kumimoji="0" lang="en-US" altLang="en-US" sz="2000" b="0" i="0" u="none" strike="noStrike" cap="none" normalizeH="0" baseline="0">
                 <a:ln>
                   <a:noFill/>
                 </a:ln>
@@ -16978,7 +16973,7 @@
               <a:t>Overall, </a:t>
             </a:r>
             <a:r>
-              <a:rPr kumimoji="0" lang="en-US" altLang="en-US" sz="2000" b="0" i="0" u="none" strike="noStrike" cap="none" normalizeH="0" baseline="0" dirty="0" err="1">
+              <a:rPr kumimoji="0" lang="en-US" altLang="en-US" sz="2000" b="0" i="0" u="none" strike="noStrike" cap="none" normalizeH="0" baseline="0" err="1">
                 <a:ln>
                   <a:noFill/>
                 </a:ln>
@@ -16991,7 +16986,7 @@
               <a:t>MovieMeter</a:t>
             </a:r>
             <a:r>
-              <a:rPr kumimoji="0" lang="en-US" altLang="en-US" sz="2000" b="0" i="0" u="none" strike="noStrike" cap="none" normalizeH="0" baseline="0" dirty="0">
+              <a:rPr kumimoji="0" lang="en-US" altLang="en-US" sz="2000" b="0" i="0" u="none" strike="noStrike" cap="none" normalizeH="0" baseline="0">
                 <a:ln>
                   <a:noFill/>
                 </a:ln>
@@ -17017,7 +17012,7 @@
               </a:spcAft>
               <a:buNone/>
             </a:pPr>
-            <a:endParaRPr lang="en-US" altLang="en-US" sz="2000" dirty="0">
+            <a:endParaRPr lang="en-US" altLang="en-US" sz="2000">
               <a:latin typeface="Arial" panose="020B0604020202020204" pitchFamily="34" charset="0"/>
             </a:endParaRPr>
           </a:p>
@@ -17035,7 +17030,7 @@
               <a:buNone/>
             </a:pPr>
             <a:r>
-              <a:rPr lang="en-US" altLang="en-US" sz="2000" b="1" dirty="0">
+              <a:rPr lang="en-US" altLang="en-US" sz="2000" b="1">
                 <a:latin typeface="Arial" panose="020B0604020202020204" pitchFamily="34" charset="0"/>
               </a:rPr>
               <a:t>Cons</a:t>
@@ -17054,7 +17049,7 @@
               </a:spcAft>
             </a:pPr>
             <a:r>
-              <a:rPr lang="en-US" altLang="en-US" sz="2000" dirty="0">
+              <a:rPr lang="en-US" altLang="en-US" sz="2000">
                 <a:latin typeface="Arial" panose="020B0604020202020204" pitchFamily="34" charset="0"/>
               </a:rPr>
               <a:t>SVD currently performs on likes of users. A user rating movies (1-10) would result in a better input set to work on.</a:t>
@@ -17073,7 +17068,7 @@
               </a:spcAft>
             </a:pPr>
             <a:r>
-              <a:rPr lang="en-US" altLang="en-US" sz="2000" dirty="0">
+              <a:rPr lang="en-US" altLang="en-US" sz="2000">
                 <a:latin typeface="Arial" panose="020B0604020202020204" pitchFamily="34" charset="0"/>
               </a:rPr>
               <a:t>SVD excels on large data results. There is not enough current data (users and movies liked) to be the most effective recommendation system.</a:t>
@@ -18012,7 +18007,7 @@
             <a:lstStyle/>
             <a:p>
               <a:pPr algn="ctr"/>
-              <a:endParaRPr lang="en-US" dirty="0"/>
+              <a:endParaRPr lang="en-US"/>
             </a:p>
           </p:txBody>
         </p:sp>
@@ -18705,7 +18700,7 @@
             <a:lstStyle/>
             <a:p>
               <a:pPr algn="ctr"/>
-              <a:endParaRPr lang="en-US" dirty="0"/>
+              <a:endParaRPr lang="en-US"/>
             </a:p>
           </p:txBody>
         </p:sp>
@@ -19398,7 +19393,7 @@
             <a:lstStyle/>
             <a:p>
               <a:pPr algn="ctr"/>
-              <a:endParaRPr lang="en-US" dirty="0"/>
+              <a:endParaRPr lang="en-US"/>
             </a:p>
           </p:txBody>
         </p:sp>
@@ -19618,7 +19613,7 @@
               <a:buNone/>
             </a:pPr>
             <a:r>
-              <a:rPr lang="en-US" sz="2900" b="1" dirty="0"/>
+              <a:rPr lang="en-US" sz="2900" b="1"/>
               <a:t>1. Content and Understanding (30 points)</a:t>
             </a:r>
           </a:p>
@@ -19627,45 +19622,45 @@
               <a:buNone/>
             </a:pPr>
             <a:br>
-              <a:rPr lang="en-US" dirty="0"/>
+              <a:rPr lang="en-US"/>
             </a:br>
             <a:r>
-              <a:rPr lang="en-US" dirty="0"/>
+              <a:rPr lang="en-US"/>
               <a:t>• Problem Definition (10 pts):</a:t>
             </a:r>
             <a:br>
-              <a:rPr lang="en-US" dirty="0"/>
+              <a:rPr lang="en-US"/>
             </a:br>
             <a:r>
-              <a:rPr lang="en-US" dirty="0"/>
+              <a:rPr lang="en-US"/>
               <a:t>Clearly explains the problem being addressed and why it is important or relevant.</a:t>
             </a:r>
             <a:br>
-              <a:rPr lang="en-US" dirty="0"/>
+              <a:rPr lang="en-US"/>
             </a:br>
             <a:r>
-              <a:rPr lang="en-US" dirty="0"/>
+              <a:rPr lang="en-US"/>
               <a:t>o 10: Exceptionally clear and insightful</a:t>
             </a:r>
             <a:br>
-              <a:rPr lang="en-US" dirty="0"/>
+              <a:rPr lang="en-US"/>
             </a:br>
             <a:r>
-              <a:rPr lang="en-US" dirty="0"/>
+              <a:rPr lang="en-US"/>
               <a:t>o 8: Clear, with good context</a:t>
             </a:r>
             <a:br>
-              <a:rPr lang="en-US" dirty="0"/>
+              <a:rPr lang="en-US"/>
             </a:br>
             <a:r>
-              <a:rPr lang="en-US" dirty="0"/>
+              <a:rPr lang="en-US"/>
               <a:t>o 6: Somewhat vague or incomplete</a:t>
             </a:r>
             <a:br>
-              <a:rPr lang="en-US" dirty="0"/>
+              <a:rPr lang="en-US"/>
             </a:br>
             <a:r>
-              <a:rPr lang="en-US" dirty="0"/>
+              <a:rPr lang="en-US"/>
               <a:t>o 4: Poorly defined or unclear</a:t>
             </a:r>
           </a:p>
@@ -19674,52 +19669,52 @@
               <a:buNone/>
             </a:pPr>
             <a:br>
-              <a:rPr lang="en-US" dirty="0"/>
+              <a:rPr lang="en-US"/>
             </a:br>
             <a:r>
-              <a:rPr lang="en-US" dirty="0"/>
+              <a:rPr lang="en-US"/>
               <a:t>• AI Methodology and Approach (10 pts):</a:t>
             </a:r>
             <a:br>
-              <a:rPr lang="en-US" dirty="0"/>
+              <a:rPr lang="en-US"/>
             </a:br>
             <a:r>
-              <a:rPr lang="en-US" dirty="0"/>
+              <a:rPr lang="en-US"/>
               <a:t>Demonstrates understanding of AI methods (e.g., ML model, NLP, computer vision, etc.)</a:t>
             </a:r>
             <a:br>
-              <a:rPr lang="en-US" dirty="0"/>
+              <a:rPr lang="en-US"/>
             </a:br>
             <a:r>
-              <a:rPr lang="en-US" dirty="0"/>
+              <a:rPr lang="en-US"/>
               <a:t>and explains how they are applied.</a:t>
             </a:r>
             <a:br>
-              <a:rPr lang="en-US" dirty="0"/>
+              <a:rPr lang="en-US"/>
             </a:br>
             <a:r>
-              <a:rPr lang="en-US" dirty="0"/>
+              <a:rPr lang="en-US"/>
               <a:t>o 10: Strong understanding and clear explanation</a:t>
             </a:r>
             <a:br>
-              <a:rPr lang="en-US" dirty="0"/>
+              <a:rPr lang="en-US"/>
             </a:br>
             <a:r>
-              <a:rPr lang="en-US" dirty="0"/>
+              <a:rPr lang="en-US"/>
               <a:t>o 8: Adequate explanation, minor gaps</a:t>
             </a:r>
             <a:br>
-              <a:rPr lang="en-US" dirty="0"/>
+              <a:rPr lang="en-US"/>
             </a:br>
             <a:r>
-              <a:rPr lang="en-US" dirty="0"/>
+              <a:rPr lang="en-US"/>
               <a:t>o 6: Basic mention with limited understanding</a:t>
             </a:r>
             <a:br>
-              <a:rPr lang="en-US" dirty="0"/>
+              <a:rPr lang="en-US"/>
             </a:br>
             <a:r>
-              <a:rPr lang="en-US" dirty="0"/>
+              <a:rPr lang="en-US"/>
               <a:t>o 4: Unclear or incorrect description</a:t>
             </a:r>
           </a:p>
@@ -19728,51 +19723,51 @@
               <a:buNone/>
             </a:pPr>
             <a:br>
-              <a:rPr lang="en-US" dirty="0"/>
+              <a:rPr lang="en-US"/>
             </a:br>
             <a:r>
-              <a:rPr lang="en-US" dirty="0"/>
+              <a:rPr lang="en-US"/>
               <a:t>• Results and Analysis (10 pts):</a:t>
             </a:r>
             <a:br>
-              <a:rPr lang="en-US" dirty="0"/>
+              <a:rPr lang="en-US"/>
             </a:br>
             <a:r>
-              <a:rPr lang="en-US" dirty="0"/>
+              <a:rPr lang="en-US"/>
               <a:t>Shows evidence of testing, results, or demonstrations; interprets findings logically.</a:t>
             </a:r>
             <a:br>
-              <a:rPr lang="en-US" dirty="0"/>
+              <a:rPr lang="en-US"/>
             </a:br>
             <a:r>
-              <a:rPr lang="en-US" dirty="0"/>
+              <a:rPr lang="en-US"/>
               <a:t>o 10: Comprehensive results with analysis</a:t>
             </a:r>
             <a:br>
-              <a:rPr lang="en-US" dirty="0"/>
+              <a:rPr lang="en-US"/>
             </a:br>
             <a:r>
-              <a:rPr lang="en-US" dirty="0"/>
+              <a:rPr lang="en-US"/>
               <a:t>o 8: Reasonable results and interpretation</a:t>
             </a:r>
             <a:br>
-              <a:rPr lang="en-US" dirty="0"/>
+              <a:rPr lang="en-US"/>
             </a:br>
             <a:r>
-              <a:rPr lang="en-US" dirty="0"/>
+              <a:rPr lang="en-US"/>
               <a:t>o 6: Limited results or unclear explanation</a:t>
             </a:r>
             <a:br>
-              <a:rPr lang="en-US" dirty="0"/>
+              <a:rPr lang="en-US"/>
             </a:br>
             <a:r>
-              <a:rPr lang="en-US" dirty="0"/>
+              <a:rPr lang="en-US"/>
               <a:t>o 4: Missing or poorly interpreted results</a:t>
             </a:r>
             <a:br>
-              <a:rPr lang="en-US" dirty="0"/>
+              <a:rPr lang="en-US"/>
             </a:br>
-            <a:endParaRPr lang="en-US" dirty="0"/>
+            <a:endParaRPr lang="en-US"/>
           </a:p>
         </p:txBody>
       </p:sp>
@@ -20121,7 +20116,7 @@
           <a:lstStyle/>
           <a:p>
             <a:r>
-              <a:rPr lang="en-US" sz="3600" dirty="0"/>
+              <a:rPr lang="en-US" sz="3600"/>
               <a:t>Problem Definition</a:t>
             </a:r>
           </a:p>
@@ -20235,7 +20230,7 @@
               <a:buNone/>
             </a:pPr>
             <a:r>
-              <a:rPr lang="en-US" sz="2000" dirty="0"/>
+              <a:rPr lang="en-US" sz="2000"/>
               <a:t>There is too many movies out there which go under the radar. We don’t want to waste the few free hours searching through a million movies or even worse, watching a bad movie.</a:t>
             </a:r>
           </a:p>
@@ -20243,14 +20238,14 @@
             <a:pPr>
               <a:buNone/>
             </a:pPr>
-            <a:endParaRPr lang="en-US" sz="2000" dirty="0"/>
+            <a:endParaRPr lang="en-US" sz="2000"/>
           </a:p>
           <a:p>
             <a:pPr>
               <a:buNone/>
             </a:pPr>
             <a:r>
-              <a:rPr lang="en-US" sz="2000" dirty="0"/>
+              <a:rPr lang="en-US" sz="2000"/>
               <a:t>The goal is to provide a recommendation website that invites the user to find new things they enjoy in an efficient setting.</a:t>
             </a:r>
           </a:p>
@@ -20258,7 +20253,7 @@
             <a:pPr>
               <a:buNone/>
             </a:pPr>
-            <a:endParaRPr lang="en-US" sz="1000" dirty="0">
+            <a:endParaRPr lang="en-US" sz="1000">
               <a:latin typeface="Arial"/>
               <a:cs typeface="Arial"/>
             </a:endParaRPr>
@@ -20534,7 +20529,7 @@
           <a:p>
             <a:pPr algn="ctr"/>
             <a:r>
-              <a:rPr lang="en-US" sz="5200" dirty="0">
+              <a:rPr lang="en-US" sz="5200">
                 <a:solidFill>
                   <a:srgbClr val="FFFFFF"/>
                 </a:solidFill>
@@ -20631,54 +20626,54 @@
           <a:lstStyle/>
           <a:p>
             <a:r>
-              <a:rPr lang="en-US" b="1" dirty="0"/>
+              <a:rPr lang="en-US" b="1"/>
               <a:t>Scalable storage:</a:t>
             </a:r>
             <a:r>
-              <a:rPr lang="en-US" dirty="0"/>
+              <a:rPr lang="en-US"/>
               <a:t> </a:t>
             </a:r>
             <a:r>
-              <a:rPr lang="en-US" dirty="0" err="1"/>
+              <a:rPr lang="en-US" err="1"/>
               <a:t>Supabase</a:t>
             </a:r>
             <a:r>
-              <a:rPr lang="en-US" dirty="0"/>
+              <a:rPr lang="en-US"/>
               <a:t> enables reliable retrieval and deployment of recommendation data.</a:t>
             </a:r>
           </a:p>
           <a:p>
             <a:r>
-              <a:rPr lang="en-US" b="1" dirty="0"/>
+              <a:rPr lang="en-US" b="1"/>
               <a:t>Collaborative filtering (SVD)</a:t>
             </a:r>
             <a:r>
-              <a:rPr lang="en-US" dirty="0"/>
+              <a:rPr lang="en-US"/>
               <a:t> effectively extracts underlying user–movie preference patterns.</a:t>
             </a:r>
           </a:p>
           <a:p>
             <a:r>
-              <a:rPr lang="en-US" b="1" dirty="0"/>
+              <a:rPr lang="en-US" b="1"/>
               <a:t>Automated training and batch insertion</a:t>
             </a:r>
             <a:r>
-              <a:rPr lang="en-US" dirty="0"/>
+              <a:rPr lang="en-US"/>
               <a:t> support periodic refresh cycles for evolving user interactions.</a:t>
             </a:r>
           </a:p>
           <a:p>
             <a:r>
-              <a:rPr lang="en-US" b="1" dirty="0"/>
+              <a:rPr lang="en-US" b="1"/>
               <a:t>Efficient preprocessing and batching</a:t>
             </a:r>
             <a:r>
-              <a:rPr lang="en-US" dirty="0"/>
+              <a:rPr lang="en-US"/>
               <a:t> ensure low computational overhead and maintainability.</a:t>
             </a:r>
           </a:p>
           <a:p>
-            <a:endParaRPr lang="en-US" dirty="0"/>
+            <a:endParaRPr lang="en-US"/>
           </a:p>
         </p:txBody>
       </p:sp>
@@ -20734,7 +20729,7 @@
           <a:lstStyle/>
           <a:p>
             <a:r>
-              <a:rPr lang="en-US" dirty="0"/>
+              <a:rPr lang="en-US"/>
               <a:t>Scoring</a:t>
             </a:r>
           </a:p>
@@ -20765,21 +20760,21 @@
               <a:buNone/>
             </a:pPr>
             <a:r>
-              <a:rPr lang="en-US" b="1" dirty="0"/>
+              <a:rPr lang="en-US" b="1"/>
               <a:t>Collaborative Filtering via SVD (from Surprise library)</a:t>
             </a:r>
           </a:p>
           <a:p>
             <a:r>
-              <a:rPr lang="en-US" dirty="0"/>
+              <a:rPr lang="en-US"/>
               <a:t>This learns user preferences from your </a:t>
             </a:r>
             <a:r>
-              <a:rPr lang="en-US" b="1" dirty="0" err="1"/>
+              <a:rPr lang="en-US" b="1" err="1"/>
               <a:t>liked_movies</a:t>
             </a:r>
             <a:r>
-              <a:rPr lang="en-US" dirty="0"/>
+              <a:rPr lang="en-US"/>
               <a:t> table.</a:t>
             </a:r>
           </a:p>
@@ -20788,13 +20783,13 @@
               <a:buNone/>
             </a:pPr>
             <a:r>
-              <a:rPr lang="en-US" b="1" dirty="0"/>
+              <a:rPr lang="en-US" b="1"/>
               <a:t>Content &amp; popularity signals</a:t>
             </a:r>
           </a:p>
           <a:p>
             <a:r>
-              <a:rPr lang="en-US" dirty="0"/>
+              <a:rPr lang="en-US"/>
               <a:t>These come from TMDB rating and genre overlap.</a:t>
             </a:r>
           </a:p>
@@ -20803,18 +20798,18 @@
               <a:buNone/>
             </a:pPr>
             <a:r>
-              <a:rPr lang="en-US" b="1" dirty="0"/>
+              <a:rPr lang="en-US" b="1"/>
               <a:t>Hybrid scoring</a:t>
             </a:r>
           </a:p>
           <a:p>
             <a:r>
-              <a:rPr lang="en-US" dirty="0"/>
+              <a:rPr lang="en-US"/>
               <a:t>All three (SVD + genre + TMDB rating) are blended to produce the final recommendation score.</a:t>
             </a:r>
           </a:p>
           <a:p>
-            <a:endParaRPr lang="en-US" dirty="0"/>
+            <a:endParaRPr lang="en-US"/>
           </a:p>
         </p:txBody>
       </p:sp>
@@ -21001,7 +20996,7 @@
           <a:lstStyle/>
           <a:p>
             <a:r>
-              <a:rPr lang="en-US" dirty="0"/>
+              <a:rPr lang="en-US"/>
               <a:t>How the Hybrid Model works ?</a:t>
             </a:r>
           </a:p>
@@ -21090,7 +21085,7 @@
           <a:lstStyle/>
           <a:p>
             <a:r>
-              <a:rPr lang="en-US" dirty="0"/>
+              <a:rPr lang="en-US"/>
               <a:t>Analysis on Effectiveness of Hybrid Movie System</a:t>
             </a:r>
           </a:p>
@@ -21118,56 +21113,56 @@
           <a:lstStyle/>
           <a:p>
             <a:r>
-              <a:rPr lang="en-US" b="1" dirty="0"/>
+              <a:rPr lang="en-US" b="1"/>
               <a:t>Accuracy of predictions</a:t>
             </a:r>
             <a:r>
-              <a:rPr lang="en-US" dirty="0"/>
+              <a:rPr lang="en-US"/>
               <a:t> generated by the SVD model</a:t>
             </a:r>
           </a:p>
           <a:p>
             <a:r>
-              <a:rPr lang="en-US" b="1" dirty="0"/>
+              <a:rPr lang="en-US" b="1"/>
               <a:t>Quality of recommended movies</a:t>
             </a:r>
             <a:r>
-              <a:rPr lang="en-US" dirty="0"/>
+              <a:rPr lang="en-US"/>
               <a:t> for different types of users</a:t>
             </a:r>
           </a:p>
           <a:p>
             <a:r>
-              <a:rPr lang="en-US" b="1" dirty="0"/>
+              <a:rPr lang="en-US" b="1"/>
               <a:t>Coverage</a:t>
             </a:r>
             <a:r>
-              <a:rPr lang="en-US" dirty="0"/>
+              <a:rPr lang="en-US"/>
               <a:t> — whether the system recommends movies across many genres</a:t>
             </a:r>
           </a:p>
           <a:p>
             <a:r>
-              <a:rPr lang="en-US" b="1" dirty="0"/>
+              <a:rPr lang="en-US" b="1"/>
               <a:t>Novelty</a:t>
             </a:r>
             <a:r>
-              <a:rPr lang="en-US" dirty="0"/>
+              <a:rPr lang="en-US"/>
               <a:t> — ensuring movies the user already liked are excluded</a:t>
             </a:r>
           </a:p>
           <a:p>
             <a:r>
-              <a:rPr lang="en-US" b="1" dirty="0"/>
+              <a:rPr lang="en-US" b="1"/>
               <a:t>Performance</a:t>
             </a:r>
             <a:r>
-              <a:rPr lang="en-US" dirty="0"/>
+              <a:rPr lang="en-US"/>
               <a:t> — runtime and scalability when analyzing large TMDB datasets</a:t>
             </a:r>
           </a:p>
           <a:p>
-            <a:endParaRPr lang="en-US" dirty="0"/>
+            <a:endParaRPr lang="en-US"/>
           </a:p>
         </p:txBody>
       </p:sp>

</xml_diff>